<commit_message>
fixed presentation and relation
</commit_message>
<xml_diff>
--- a/BENCHMARKING E SENTIMENT ANALYSIS SU CLUSTER SPARK.pptx
+++ b/BENCHMARKING E SENTIMENT ANALYSIS SU CLUSTER SPARK.pptx
@@ -5,23 +5,22 @@
     <p:sldMasterId id="2147483648" r:id="rId4"/>
   </p:sldMasterIdLst>
   <p:notesMasterIdLst>
-    <p:notesMasterId r:id="rId16"/>
+    <p:notesMasterId r:id="rId15"/>
   </p:notesMasterIdLst>
   <p:handoutMasterIdLst>
-    <p:handoutMasterId r:id="rId17"/>
+    <p:handoutMasterId r:id="rId16"/>
   </p:handoutMasterIdLst>
   <p:sldIdLst>
     <p:sldId id="256" r:id="rId5"/>
     <p:sldId id="257" r:id="rId6"/>
     <p:sldId id="300" r:id="rId7"/>
-    <p:sldId id="286" r:id="rId8"/>
-    <p:sldId id="302" r:id="rId9"/>
-    <p:sldId id="289" r:id="rId10"/>
-    <p:sldId id="299" r:id="rId11"/>
-    <p:sldId id="290" r:id="rId12"/>
-    <p:sldId id="304" r:id="rId13"/>
-    <p:sldId id="305" r:id="rId14"/>
-    <p:sldId id="296" r:id="rId15"/>
+    <p:sldId id="302" r:id="rId8"/>
+    <p:sldId id="289" r:id="rId9"/>
+    <p:sldId id="299" r:id="rId10"/>
+    <p:sldId id="290" r:id="rId11"/>
+    <p:sldId id="304" r:id="rId12"/>
+    <p:sldId id="305" r:id="rId13"/>
+    <p:sldId id="296" r:id="rId14"/>
   </p:sldIdLst>
   <p:sldSz cx="12192000" cy="6858000"/>
   <p:notesSz cx="6858000" cy="9144000"/>
@@ -3913,8 +3912,8 @@
             </a:lnSpc>
           </a:pPr>
           <a:r>
-            <a:rPr lang="it-IT"/>
-            <a:t>Analisi del sentiment di un dataset massivo eterogeneo composto da recensioni utente su venti applicazioni distinte, estratte dal Google Play StoreTestare scalabilità replica e fault tolerance</a:t>
+            <a:rPr lang="it-IT" dirty="0"/>
+            <a:t>Analisi del sentiment di un dataset massivo eterogeneo composto da recensioni utente su venti applicazioni distinte, estratte dal Google Play Store</a:t>
           </a:r>
           <a:endParaRPr lang="en-US" dirty="0"/>
         </a:p>
@@ -3997,8 +3996,8 @@
             </a:lnSpc>
           </a:pPr>
           <a:r>
-            <a:rPr lang="it-IT"/>
-            <a:t>progettare, implementare e testare una pipeline di Big Data Analytics utilizzando Apache Spark in un ambiente distribuito su Cloud Azure effettuando anche benchmark su prestazioni e scalabilità</a:t>
+            <a:rPr lang="it-IT" dirty="0"/>
+            <a:t>progettare, implementare e testare una pipeline di Big Data Analytics utilizzando Apache Spark in un ambiente distribuito su Cloud Azure effettuando benchmark su prestazioni e scalabilità</a:t>
           </a:r>
           <a:endParaRPr lang="en-US" dirty="0"/>
         </a:p>
@@ -4547,14 +4546,14 @@
             </a:lnSpc>
           </a:pPr>
           <a:r>
-            <a:rPr lang="it-IT" b="1"/>
+            <a:rPr lang="it-IT" b="1" dirty="0"/>
             <a:t>Motore di calcolo: </a:t>
           </a:r>
           <a:r>
-            <a:rPr lang="it-IT"/>
+            <a:rPr lang="it-IT" dirty="0"/>
             <a:t>Apache Spark 3.5.0</a:t>
           </a:r>
-          <a:endParaRPr lang="en-US"/>
+          <a:endParaRPr lang="en-US" dirty="0"/>
         </a:p>
       </dgm:t>
     </dgm:pt>
@@ -4638,14 +4637,22 @@
             </a:lnSpc>
           </a:pPr>
           <a:r>
-            <a:rPr lang="it-IT" b="1"/>
+            <a:rPr lang="it-IT" b="1" dirty="0"/>
             <a:t>Linguaggio:</a:t>
           </a:r>
           <a:r>
-            <a:rPr lang="it-IT"/>
-            <a:t> Python per la definizione della pipeline NLP.</a:t>
+            <a:rPr lang="it-IT" dirty="0"/>
+            <a:t> Python per la definizione della pipeline NLP e la data </a:t>
           </a:r>
-          <a:endParaRPr lang="en-US"/>
+          <a:r>
+            <a:rPr lang="it-IT" dirty="0" err="1"/>
+            <a:t>visuallization</a:t>
+          </a:r>
+          <a:r>
+            <a:rPr lang="it-IT" dirty="0"/>
+            <a:t>.</a:t>
+          </a:r>
+          <a:endParaRPr lang="en-US" dirty="0"/>
         </a:p>
       </dgm:t>
     </dgm:pt>
@@ -5113,7 +5120,7 @@
         <a:lstStyle/>
         <a:p>
           <a:r>
-            <a:rPr lang="it-IT" b="1"/>
+            <a:rPr lang="it-IT" b="1" dirty="0"/>
             <a:t>Ingestione Dati</a:t>
           </a:r>
           <a:endParaRPr lang="it-IT" dirty="0"/>
@@ -5191,14 +5198,13 @@
         <a:lstStyle/>
         <a:p>
           <a:r>
-            <a:rPr lang="it-IT" b="1"/>
+            <a:rPr lang="it-IT" b="1" dirty="0"/>
             <a:t>Action:</a:t>
           </a:r>
           <a:r>
-            <a:rPr lang="it-IT"/>
+            <a:rPr lang="it-IT" dirty="0"/>
             <a:t> Unificazione schema e normalizzazione</a:t>
           </a:r>
-          <a:endParaRPr lang="it-IT" dirty="0"/>
         </a:p>
       </dgm:t>
     </dgm:pt>
@@ -5232,24 +5238,23 @@
         <a:lstStyle/>
         <a:p>
           <a:r>
-            <a:rPr lang="it-IT" b="1"/>
+            <a:rPr lang="it-IT" b="1" dirty="0"/>
             <a:t>Arricchimento:</a:t>
           </a:r>
           <a:r>
-            <a:rPr lang="it-IT"/>
-            <a:t> Tagging della sorgente </a:t>
+            <a:rPr lang="it-IT" dirty="0"/>
+            <a:t> aggiunta della sorgente </a:t>
           </a:r>
           <a:r>
-            <a:rPr lang="it-IT">
+            <a:rPr lang="it-IT" dirty="0" err="1">
               <a:latin typeface="Courier New" panose="02070309020205020404" pitchFamily="49" charset="0"/>
             </a:rPr>
             <a:t>app_name</a:t>
           </a:r>
           <a:r>
-            <a:rPr lang="it-IT"/>
+            <a:rPr lang="it-IT" dirty="0"/>
             <a:t> per tracciabilità</a:t>
           </a:r>
-          <a:endParaRPr lang="it-IT" dirty="0"/>
         </a:p>
       </dgm:t>
     </dgm:pt>
@@ -5555,13 +5560,14 @@
         <a:lstStyle/>
         <a:p>
           <a:r>
-            <a:rPr lang="it-IT" b="1"/>
-            <a:t>Vantaggio:</a:t>
+            <a:rPr lang="it-IT" b="1" dirty="0"/>
+            <a:t>Vantaggio: </a:t>
           </a:r>
           <a:r>
-            <a:rPr lang="it-IT"/>
-            <a:t> Abilitazione Projection Pushdown</a:t>
+            <a:rPr lang="it-IT" b="0" dirty="0"/>
+            <a:t>conversione in un formato più adatto a questo tipo di analisi</a:t>
           </a:r>
+          <a:endParaRPr lang="it-IT" dirty="0"/>
         </a:p>
       </dgm:t>
     </dgm:pt>
@@ -6343,6 +6349,42 @@
             <a:rPr lang="en-US" b="1" dirty="0" err="1"/>
             <a:t>esportazione</a:t>
           </a:r>
+          <a:r>
+            <a:rPr lang="en-US" b="1" dirty="0"/>
+            <a:t>: </a:t>
+          </a:r>
+          <a:r>
+            <a:rPr lang="en-US" b="0" dirty="0" err="1"/>
+            <a:t>esportazione</a:t>
+          </a:r>
+          <a:r>
+            <a:rPr lang="en-US" b="0" dirty="0"/>
+            <a:t> </a:t>
+          </a:r>
+          <a:r>
+            <a:rPr lang="en-US" b="0" dirty="0" err="1"/>
+            <a:t>dei</a:t>
+          </a:r>
+          <a:r>
+            <a:rPr lang="en-US" b="0" dirty="0"/>
+            <a:t> </a:t>
+          </a:r>
+          <a:r>
+            <a:rPr lang="en-US" b="0" dirty="0" err="1"/>
+            <a:t>risultati</a:t>
+          </a:r>
+          <a:r>
+            <a:rPr lang="en-US" b="0" dirty="0"/>
+            <a:t> in </a:t>
+          </a:r>
+          <a:r>
+            <a:rPr lang="en-US" b="0" dirty="0" err="1"/>
+            <a:t>formato</a:t>
+          </a:r>
+          <a:r>
+            <a:rPr lang="en-US" b="0" dirty="0"/>
+            <a:t> csv</a:t>
+          </a:r>
           <a:endParaRPr lang="en-US" b="1" dirty="0"/>
         </a:p>
       </dgm:t>
@@ -6431,6 +6473,44 @@
       <dgm:prSet presAssocID="{6F253451-A320-4BE2-96DD-A7618F9F3EE0}" presName="space" presStyleCnt="0"/>
       <dgm:spPr/>
     </dgm:pt>
+    <dgm:pt modelId="{D4CE49E1-0ACB-4D10-AD21-8514FF1CE408}" type="pres">
+      <dgm:prSet presAssocID="{FC534C18-BF3D-473A-B550-60F84DF8C583}" presName="linV" presStyleCnt="0"/>
+      <dgm:spPr/>
+    </dgm:pt>
+    <dgm:pt modelId="{72F47416-D62E-48A7-8A0D-795886549DB1}" type="pres">
+      <dgm:prSet presAssocID="{FC534C18-BF3D-473A-B550-60F84DF8C583}" presName="spVertical1" presStyleCnt="0"/>
+      <dgm:spPr/>
+    </dgm:pt>
+    <dgm:pt modelId="{C901A7DC-005E-40D8-974D-25AA37B3523A}" type="pres">
+      <dgm:prSet presAssocID="{FC534C18-BF3D-473A-B550-60F84DF8C583}" presName="parTx" presStyleLbl="revTx" presStyleIdx="2" presStyleCnt="8">
+        <dgm:presLayoutVars>
+          <dgm:chMax val="0"/>
+          <dgm:chPref val="0"/>
+          <dgm:bulletEnabled val="1"/>
+        </dgm:presLayoutVars>
+      </dgm:prSet>
+      <dgm:spPr/>
+    </dgm:pt>
+    <dgm:pt modelId="{AAE58E6F-2055-4915-8D22-282D085D6AFA}" type="pres">
+      <dgm:prSet presAssocID="{FC534C18-BF3D-473A-B550-60F84DF8C583}" presName="spVertical2" presStyleCnt="0"/>
+      <dgm:spPr/>
+    </dgm:pt>
+    <dgm:pt modelId="{D8F016AF-8D41-4027-B970-A918BAB7BC56}" type="pres">
+      <dgm:prSet presAssocID="{FC534C18-BF3D-473A-B550-60F84DF8C583}" presName="spVertical3" presStyleCnt="0"/>
+      <dgm:spPr/>
+    </dgm:pt>
+    <dgm:pt modelId="{8A30E715-6168-49DC-AB6B-CE2665F37521}" type="pres">
+      <dgm:prSet presAssocID="{FC534C18-BF3D-473A-B550-60F84DF8C583}" presName="desTx" presStyleLbl="revTx" presStyleIdx="3" presStyleCnt="8">
+        <dgm:presLayoutVars>
+          <dgm:bulletEnabled val="1"/>
+        </dgm:presLayoutVars>
+      </dgm:prSet>
+      <dgm:spPr/>
+    </dgm:pt>
+    <dgm:pt modelId="{9C877AC0-21E0-4EAF-9537-87730B00AF4C}" type="pres">
+      <dgm:prSet presAssocID="{BFD8EE90-54BF-4A93-8098-957DCB783597}" presName="space" presStyleCnt="0"/>
+      <dgm:spPr/>
+    </dgm:pt>
     <dgm:pt modelId="{BBA45BFC-63EC-4325-B14B-3729D9A7AB18}" type="pres">
       <dgm:prSet presAssocID="{D46DD437-FFD1-4DD1-A740-E84BDBEB0A10}" presName="linV" presStyleCnt="0"/>
       <dgm:spPr/>
@@ -6440,7 +6520,7 @@
       <dgm:spPr/>
     </dgm:pt>
     <dgm:pt modelId="{4F2F3A95-9C38-4EC4-B68F-D999D42C91D2}" type="pres">
-      <dgm:prSet presAssocID="{D46DD437-FFD1-4DD1-A740-E84BDBEB0A10}" presName="parTx" presStyleLbl="revTx" presStyleIdx="2" presStyleCnt="8">
+      <dgm:prSet presAssocID="{D46DD437-FFD1-4DD1-A740-E84BDBEB0A10}" presName="parTx" presStyleLbl="revTx" presStyleIdx="4" presStyleCnt="8">
         <dgm:presLayoutVars>
           <dgm:chMax val="0"/>
           <dgm:chPref val="0"/>
@@ -6458,7 +6538,7 @@
       <dgm:spPr/>
     </dgm:pt>
     <dgm:pt modelId="{3F49D824-B696-4EBD-8555-243546CB9537}" type="pres">
-      <dgm:prSet presAssocID="{D46DD437-FFD1-4DD1-A740-E84BDBEB0A10}" presName="desTx" presStyleLbl="revTx" presStyleIdx="3" presStyleCnt="8">
+      <dgm:prSet presAssocID="{D46DD437-FFD1-4DD1-A740-E84BDBEB0A10}" presName="desTx" presStyleLbl="revTx" presStyleIdx="5" presStyleCnt="8">
         <dgm:presLayoutVars>
           <dgm:bulletEnabled val="1"/>
         </dgm:presLayoutVars>
@@ -6467,44 +6547,6 @@
     </dgm:pt>
     <dgm:pt modelId="{DD5F5E4F-4FC1-4555-97B2-958E38815AD7}" type="pres">
       <dgm:prSet presAssocID="{2552F0D0-DFE7-4CD0-B250-D49595FDF2B3}" presName="space" presStyleCnt="0"/>
-      <dgm:spPr/>
-    </dgm:pt>
-    <dgm:pt modelId="{D4CE49E1-0ACB-4D10-AD21-8514FF1CE408}" type="pres">
-      <dgm:prSet presAssocID="{FC534C18-BF3D-473A-B550-60F84DF8C583}" presName="linV" presStyleCnt="0"/>
-      <dgm:spPr/>
-    </dgm:pt>
-    <dgm:pt modelId="{72F47416-D62E-48A7-8A0D-795886549DB1}" type="pres">
-      <dgm:prSet presAssocID="{FC534C18-BF3D-473A-B550-60F84DF8C583}" presName="spVertical1" presStyleCnt="0"/>
-      <dgm:spPr/>
-    </dgm:pt>
-    <dgm:pt modelId="{C901A7DC-005E-40D8-974D-25AA37B3523A}" type="pres">
-      <dgm:prSet presAssocID="{FC534C18-BF3D-473A-B550-60F84DF8C583}" presName="parTx" presStyleLbl="revTx" presStyleIdx="4" presStyleCnt="8">
-        <dgm:presLayoutVars>
-          <dgm:chMax val="0"/>
-          <dgm:chPref val="0"/>
-          <dgm:bulletEnabled val="1"/>
-        </dgm:presLayoutVars>
-      </dgm:prSet>
-      <dgm:spPr/>
-    </dgm:pt>
-    <dgm:pt modelId="{AAE58E6F-2055-4915-8D22-282D085D6AFA}" type="pres">
-      <dgm:prSet presAssocID="{FC534C18-BF3D-473A-B550-60F84DF8C583}" presName="spVertical2" presStyleCnt="0"/>
-      <dgm:spPr/>
-    </dgm:pt>
-    <dgm:pt modelId="{D8F016AF-8D41-4027-B970-A918BAB7BC56}" type="pres">
-      <dgm:prSet presAssocID="{FC534C18-BF3D-473A-B550-60F84DF8C583}" presName="spVertical3" presStyleCnt="0"/>
-      <dgm:spPr/>
-    </dgm:pt>
-    <dgm:pt modelId="{8A30E715-6168-49DC-AB6B-CE2665F37521}" type="pres">
-      <dgm:prSet presAssocID="{FC534C18-BF3D-473A-B550-60F84DF8C583}" presName="desTx" presStyleLbl="revTx" presStyleIdx="5" presStyleCnt="8">
-        <dgm:presLayoutVars>
-          <dgm:bulletEnabled val="1"/>
-        </dgm:presLayoutVars>
-      </dgm:prSet>
-      <dgm:spPr/>
-    </dgm:pt>
-    <dgm:pt modelId="{9C877AC0-21E0-4EAF-9537-87730B00AF4C}" type="pres">
-      <dgm:prSet presAssocID="{BFD8EE90-54BF-4A93-8098-957DCB783597}" presName="space" presStyleCnt="0"/>
       <dgm:spPr/>
     </dgm:pt>
     <dgm:pt modelId="{69581A74-3329-4467-BC8C-5A0085EDF3E3}" type="pres">
@@ -6555,68 +6597,68 @@
     </dgm:pt>
   </dgm:ptLst>
   <dgm:cxnLst>
+    <dgm:cxn modelId="{47859306-20EC-4922-891B-1EA96353011E}" type="presOf" srcId="{B74098FD-5786-459D-A79F-D890A17A5E72}" destId="{3F49D824-B696-4EBD-8555-243546CB9537}" srcOrd="0" destOrd="0" presId="urn:microsoft.com/office/officeart/2005/8/layout/hProcess3"/>
+    <dgm:cxn modelId="{D389AA06-A5F7-4433-928A-18C1475D4DBA}" type="presOf" srcId="{65F8FE36-47EA-4901-A6C5-A932D66CA951}" destId="{9D196266-D08A-4337-A122-6F206D0BF9FE}" srcOrd="0" destOrd="1" presId="urn:microsoft.com/office/officeart/2005/8/layout/hProcess3"/>
     <dgm:cxn modelId="{EC8C680D-FB90-4BAB-88ED-D321536B31CA}" srcId="{150C9D06-B6FD-4222-845B-3F6E8BBB72EC}" destId="{6B9FF0EA-C17E-4CE8-9294-FB45873D4C8F}" srcOrd="2" destOrd="0" parTransId="{2920CF28-AC4F-4C57-80A0-EE50A50080D6}" sibTransId="{2CE8B7E9-B47E-4079-A911-6C55311E2110}"/>
     <dgm:cxn modelId="{7FA0AB0E-377F-4802-91E5-73A8CF763E44}" srcId="{61B86C4F-B00C-47E5-98BA-1CBC55F510B6}" destId="{1BD3C55F-7395-44CD-B024-68F2FA90EDF0}" srcOrd="3" destOrd="0" parTransId="{50399BBC-E298-4C2A-B033-8A74AD0D17C8}" sibTransId="{9E7DD5CC-87BA-46D1-8209-88EA9DEF306E}"/>
     <dgm:cxn modelId="{C20F6A11-8DCA-48DF-AD28-AA28FD5697D2}" srcId="{FC534C18-BF3D-473A-B550-60F84DF8C583}" destId="{D37B0AFD-F07E-4E23-BCF7-E8F866745BE5}" srcOrd="2" destOrd="0" parTransId="{83ABF371-8A7D-4F36-AE76-6F3BB9EA19D9}" sibTransId="{171424D6-3987-457A-972B-6D631FD340F9}"/>
-    <dgm:cxn modelId="{836FF512-0FA8-41D1-8910-F3A8AAA7DE40}" srcId="{61B86C4F-B00C-47E5-98BA-1CBC55F510B6}" destId="{FC534C18-BF3D-473A-B550-60F84DF8C583}" srcOrd="2" destOrd="0" parTransId="{492AF104-10B7-424E-9201-D7D922AABF6E}" sibTransId="{BFD8EE90-54BF-4A93-8098-957DCB783597}"/>
-    <dgm:cxn modelId="{86FE0215-F99E-45F7-9127-9275BDAE3E24}" type="presOf" srcId="{D0E69F7D-5BED-47EE-8510-168F679D5E38}" destId="{3F49D824-B696-4EBD-8555-243546CB9537}" srcOrd="0" destOrd="1" presId="urn:microsoft.com/office/officeart/2005/8/layout/hProcess3"/>
-    <dgm:cxn modelId="{24DC9D22-C926-4D9D-997A-46B1F94AB0C4}" type="presOf" srcId="{FC534C18-BF3D-473A-B550-60F84DF8C583}" destId="{C901A7DC-005E-40D8-974D-25AA37B3523A}" srcOrd="0" destOrd="0" presId="urn:microsoft.com/office/officeart/2005/8/layout/hProcess3"/>
-    <dgm:cxn modelId="{D7A63A27-4009-48EB-B612-1E51F9BCB2E3}" type="presOf" srcId="{D37B0AFD-F07E-4E23-BCF7-E8F866745BE5}" destId="{8A30E715-6168-49DC-AB6B-CE2665F37521}" srcOrd="0" destOrd="2" presId="urn:microsoft.com/office/officeart/2005/8/layout/hProcess3"/>
+    <dgm:cxn modelId="{836FF512-0FA8-41D1-8910-F3A8AAA7DE40}" srcId="{61B86C4F-B00C-47E5-98BA-1CBC55F510B6}" destId="{FC534C18-BF3D-473A-B550-60F84DF8C583}" srcOrd="1" destOrd="0" parTransId="{492AF104-10B7-424E-9201-D7D922AABF6E}" sibTransId="{BFD8EE90-54BF-4A93-8098-957DCB783597}"/>
+    <dgm:cxn modelId="{A6610E63-5124-453F-A566-951F62DD1A35}" type="presOf" srcId="{F16A7932-72AC-4913-855E-95C9EC0C328D}" destId="{8A30E715-6168-49DC-AB6B-CE2665F37521}" srcOrd="0" destOrd="1" presId="urn:microsoft.com/office/officeart/2005/8/layout/hProcess3"/>
     <dgm:cxn modelId="{E4644844-3EEF-459E-AFB2-2E94404643E3}" srcId="{1BD3C55F-7395-44CD-B024-68F2FA90EDF0}" destId="{65F8FE36-47EA-4901-A6C5-A932D66CA951}" srcOrd="1" destOrd="0" parTransId="{FF24EB2D-A52A-4575-8062-78A41D920739}" sibTransId="{1B3904D4-9F99-4E47-8299-18857C3B3ECF}"/>
-    <dgm:cxn modelId="{1CC88644-39F9-446B-B94B-20D9017C2B00}" type="presOf" srcId="{1BD3C55F-7395-44CD-B024-68F2FA90EDF0}" destId="{095D2C15-6F43-4DFE-9E36-2A77E47B4940}" srcOrd="0" destOrd="0" presId="urn:microsoft.com/office/officeart/2005/8/layout/hProcess3"/>
-    <dgm:cxn modelId="{6A558C46-0457-4FF6-B17D-9C1D9636B9CC}" type="presOf" srcId="{4B52329F-E1E1-428F-9BD3-2D128A36CFA2}" destId="{226C86D5-9BB0-4EC1-B9C1-712B8C4D493B}" srcOrd="0" destOrd="0" presId="urn:microsoft.com/office/officeart/2005/8/layout/hProcess3"/>
     <dgm:cxn modelId="{0B9FEB69-EB36-4B81-A3A0-2D14DE8DF5A8}" srcId="{FC534C18-BF3D-473A-B550-60F84DF8C583}" destId="{0B9646AF-83BE-4382-9B39-DCA73D5B60BE}" srcOrd="0" destOrd="0" parTransId="{B8F1C6E0-8743-46D9-9BB9-EC1BDABEE4A2}" sibTransId="{FBE752BF-5838-4D13-A452-2D9B1911A5F7}"/>
     <dgm:cxn modelId="{D6497C6C-1E4F-4765-A555-E93980097855}" srcId="{D46DD437-FFD1-4DD1-A740-E84BDBEB0A10}" destId="{B74098FD-5786-459D-A79F-D890A17A5E72}" srcOrd="0" destOrd="0" parTransId="{B2C18F8E-3BF7-40E5-B0D1-0D770826A530}" sibTransId="{DF00C396-FC45-4808-A039-AA8E310F7F01}"/>
+    <dgm:cxn modelId="{0C0FBF4E-747D-470E-AFCE-8DA9DFB5A99B}" type="presOf" srcId="{41A57E03-A76D-4306-8355-9AB05C49ACCD}" destId="{9D196266-D08A-4337-A122-6F206D0BF9FE}" srcOrd="0" destOrd="0" presId="urn:microsoft.com/office/officeart/2005/8/layout/hProcess3"/>
     <dgm:cxn modelId="{557FDB4E-770E-4B0A-889C-0D48E30C3103}" srcId="{FC534C18-BF3D-473A-B550-60F84DF8C583}" destId="{F16A7932-72AC-4913-855E-95C9EC0C328D}" srcOrd="1" destOrd="0" parTransId="{14131561-C0FA-4F52-A165-FA4EF4C54F0D}" sibTransId="{9DA3C5A9-7EF7-4F6C-8239-FD20BBCD2AAA}"/>
-    <dgm:cxn modelId="{43FCAF53-8B93-4A1B-885F-D6247E4D3DC2}" type="presOf" srcId="{D46DD437-FFD1-4DD1-A740-E84BDBEB0A10}" destId="{4F2F3A95-9C38-4EC4-B68F-D999D42C91D2}" srcOrd="0" destOrd="0" presId="urn:microsoft.com/office/officeart/2005/8/layout/hProcess3"/>
-    <dgm:cxn modelId="{8C5F3D57-4F96-40E1-964D-F9F67510316C}" type="presOf" srcId="{8BDD8C66-BD95-41CF-90F8-66276BD02BCA}" destId="{226C86D5-9BB0-4EC1-B9C1-712B8C4D493B}" srcOrd="0" destOrd="1" presId="urn:microsoft.com/office/officeart/2005/8/layout/hProcess3"/>
-    <dgm:cxn modelId="{1B71A658-BC4D-47D5-9F08-0EFD519C959A}" type="presOf" srcId="{6B9FF0EA-C17E-4CE8-9294-FB45873D4C8F}" destId="{226C86D5-9BB0-4EC1-B9C1-712B8C4D493B}" srcOrd="0" destOrd="2" presId="urn:microsoft.com/office/officeart/2005/8/layout/hProcess3"/>
+    <dgm:cxn modelId="{6BE09C50-91A9-4777-9B1E-164989E789A0}" type="presOf" srcId="{D46DD437-FFD1-4DD1-A740-E84BDBEB0A10}" destId="{4F2F3A95-9C38-4EC4-B68F-D999D42C91D2}" srcOrd="0" destOrd="0" presId="urn:microsoft.com/office/officeart/2005/8/layout/hProcess3"/>
+    <dgm:cxn modelId="{A9CC0D55-0123-460C-AA6D-ABF68ECE1B3E}" type="presOf" srcId="{D0E69F7D-5BED-47EE-8510-168F679D5E38}" destId="{3F49D824-B696-4EBD-8555-243546CB9537}" srcOrd="0" destOrd="1" presId="urn:microsoft.com/office/officeart/2005/8/layout/hProcess3"/>
+    <dgm:cxn modelId="{B707317C-BB24-4977-B481-8AAAA306CE95}" type="presOf" srcId="{8BDD8C66-BD95-41CF-90F8-66276BD02BCA}" destId="{226C86D5-9BB0-4EC1-B9C1-712B8C4D493B}" srcOrd="0" destOrd="1" presId="urn:microsoft.com/office/officeart/2005/8/layout/hProcess3"/>
     <dgm:cxn modelId="{39A4A57E-27DD-4340-8976-84CD20398E4A}" srcId="{61B86C4F-B00C-47E5-98BA-1CBC55F510B6}" destId="{150C9D06-B6FD-4222-845B-3F6E8BBB72EC}" srcOrd="0" destOrd="0" parTransId="{F7514A32-D881-4F26-BEF6-E80F20F007E6}" sibTransId="{6F253451-A320-4BE2-96DD-A7618F9F3EE0}"/>
-    <dgm:cxn modelId="{BDF4687F-E2E2-4577-808A-A18325DDDCD0}" type="presOf" srcId="{0B9646AF-83BE-4382-9B39-DCA73D5B60BE}" destId="{8A30E715-6168-49DC-AB6B-CE2665F37521}" srcOrd="0" destOrd="0" presId="urn:microsoft.com/office/officeart/2005/8/layout/hProcess3"/>
-    <dgm:cxn modelId="{656B7295-7C5A-4E4D-9968-CCA89EBBE0E9}" type="presOf" srcId="{B74098FD-5786-459D-A79F-D890A17A5E72}" destId="{3F49D824-B696-4EBD-8555-243546CB9537}" srcOrd="0" destOrd="0" presId="urn:microsoft.com/office/officeart/2005/8/layout/hProcess3"/>
+    <dgm:cxn modelId="{04EC8395-4B43-4DEA-A215-EC7869C41257}" type="presOf" srcId="{4B52329F-E1E1-428F-9BD3-2D128A36CFA2}" destId="{226C86D5-9BB0-4EC1-B9C1-712B8C4D493B}" srcOrd="0" destOrd="0" presId="urn:microsoft.com/office/officeart/2005/8/layout/hProcess3"/>
     <dgm:cxn modelId="{3F7ACB95-F54C-4A7A-8D85-40E81DD7F96F}" srcId="{D46DD437-FFD1-4DD1-A740-E84BDBEB0A10}" destId="{D0E69F7D-5BED-47EE-8510-168F679D5E38}" srcOrd="1" destOrd="0" parTransId="{9845BF79-3837-4300-8E0A-386CD0F9B880}" sibTransId="{AD092441-3F69-4992-A310-85BBE157ED14}"/>
     <dgm:cxn modelId="{490B3B98-4316-4F82-A50D-0F34C0E7CD8A}" srcId="{150C9D06-B6FD-4222-845B-3F6E8BBB72EC}" destId="{4B52329F-E1E1-428F-9BD3-2D128A36CFA2}" srcOrd="0" destOrd="0" parTransId="{DA190A79-A1A9-475A-B6AE-0275972EA8BC}" sibTransId="{B8D43D27-96B9-49E7-A3B4-1FE7A7A936EE}"/>
-    <dgm:cxn modelId="{629CDAB2-6DF2-45CD-8C74-A316F1B0E2FF}" type="presOf" srcId="{41A57E03-A76D-4306-8355-9AB05C49ACCD}" destId="{9D196266-D08A-4337-A122-6F206D0BF9FE}" srcOrd="0" destOrd="0" presId="urn:microsoft.com/office/officeart/2005/8/layout/hProcess3"/>
-    <dgm:cxn modelId="{992214B3-D62F-4491-9BCB-4B62CEFC4552}" type="presOf" srcId="{F16A7932-72AC-4913-855E-95C9EC0C328D}" destId="{8A30E715-6168-49DC-AB6B-CE2665F37521}" srcOrd="0" destOrd="1" presId="urn:microsoft.com/office/officeart/2005/8/layout/hProcess3"/>
-    <dgm:cxn modelId="{B599EDC4-802B-4B9D-9A06-8732D8584DD1}" type="presOf" srcId="{65F8FE36-47EA-4901-A6C5-A932D66CA951}" destId="{9D196266-D08A-4337-A122-6F206D0BF9FE}" srcOrd="0" destOrd="1" presId="urn:microsoft.com/office/officeart/2005/8/layout/hProcess3"/>
+    <dgm:cxn modelId="{51781BA1-D700-4744-8CB3-10038F6100AB}" type="presOf" srcId="{0B9646AF-83BE-4382-9B39-DCA73D5B60BE}" destId="{8A30E715-6168-49DC-AB6B-CE2665F37521}" srcOrd="0" destOrd="0" presId="urn:microsoft.com/office/officeart/2005/8/layout/hProcess3"/>
+    <dgm:cxn modelId="{22A8BDA6-821C-4F08-8C37-0DBCF5DFF532}" type="presOf" srcId="{150C9D06-B6FD-4222-845B-3F6E8BBB72EC}" destId="{A231D25E-5976-40F2-9B6B-157CD57E9B20}" srcOrd="0" destOrd="0" presId="urn:microsoft.com/office/officeart/2005/8/layout/hProcess3"/>
+    <dgm:cxn modelId="{48FE09C0-7D28-429B-8FBB-4D8008FA1A7D}" type="presOf" srcId="{1BD3C55F-7395-44CD-B024-68F2FA90EDF0}" destId="{095D2C15-6F43-4DFE-9E36-2A77E47B4940}" srcOrd="0" destOrd="0" presId="urn:microsoft.com/office/officeart/2005/8/layout/hProcess3"/>
     <dgm:cxn modelId="{2CCC34CD-47E6-4F08-B0FD-34D45F810A8E}" srcId="{150C9D06-B6FD-4222-845B-3F6E8BBB72EC}" destId="{8BDD8C66-BD95-41CF-90F8-66276BD02BCA}" srcOrd="1" destOrd="0" parTransId="{B419C5CB-2A82-40E0-8208-60366F7B7E65}" sibTransId="{5AD5135C-71B8-49E4-A816-816541DCEB81}"/>
     <dgm:cxn modelId="{C3E55ECD-E2BB-450A-8DEB-028C432720E1}" srcId="{1BD3C55F-7395-44CD-B024-68F2FA90EDF0}" destId="{41A57E03-A76D-4306-8355-9AB05C49ACCD}" srcOrd="0" destOrd="0" parTransId="{30DF7BE1-F0E0-432A-B3A3-D691AECC9A06}" sibTransId="{CBFC2F3D-75D7-4FFB-A21D-4659670829F3}"/>
-    <dgm:cxn modelId="{052087D4-096C-4B2A-A610-9DFF14378C56}" type="presOf" srcId="{150C9D06-B6FD-4222-845B-3F6E8BBB72EC}" destId="{A231D25E-5976-40F2-9B6B-157CD57E9B20}" srcOrd="0" destOrd="0" presId="urn:microsoft.com/office/officeart/2005/8/layout/hProcess3"/>
-    <dgm:cxn modelId="{9308D4EF-EC05-459B-AAF7-7C8645A30AB4}" srcId="{61B86C4F-B00C-47E5-98BA-1CBC55F510B6}" destId="{D46DD437-FFD1-4DD1-A740-E84BDBEB0A10}" srcOrd="1" destOrd="0" parTransId="{EDD7B021-2FEF-4238-8FED-477D5A4FFBBD}" sibTransId="{2552F0D0-DFE7-4CD0-B250-D49595FDF2B3}"/>
+    <dgm:cxn modelId="{D90856DE-DB44-4CD3-B9D1-22E1A5E7C2D7}" type="presOf" srcId="{FC534C18-BF3D-473A-B550-60F84DF8C583}" destId="{C901A7DC-005E-40D8-974D-25AA37B3523A}" srcOrd="0" destOrd="0" presId="urn:microsoft.com/office/officeart/2005/8/layout/hProcess3"/>
+    <dgm:cxn modelId="{CD38F0E1-A425-4972-BDF9-BF8E0975FB85}" type="presOf" srcId="{6B9FF0EA-C17E-4CE8-9294-FB45873D4C8F}" destId="{226C86D5-9BB0-4EC1-B9C1-712B8C4D493B}" srcOrd="0" destOrd="2" presId="urn:microsoft.com/office/officeart/2005/8/layout/hProcess3"/>
+    <dgm:cxn modelId="{9308D4EF-EC05-459B-AAF7-7C8645A30AB4}" srcId="{61B86C4F-B00C-47E5-98BA-1CBC55F510B6}" destId="{D46DD437-FFD1-4DD1-A740-E84BDBEB0A10}" srcOrd="2" destOrd="0" parTransId="{EDD7B021-2FEF-4238-8FED-477D5A4FFBBD}" sibTransId="{2552F0D0-DFE7-4CD0-B250-D49595FDF2B3}"/>
     <dgm:cxn modelId="{04C761F7-0EEC-4FE0-AF78-7D8C5DC56D88}" type="presOf" srcId="{61B86C4F-B00C-47E5-98BA-1CBC55F510B6}" destId="{93331CF4-A746-468B-8C11-9DFB8FD0B69F}" srcOrd="0" destOrd="0" presId="urn:microsoft.com/office/officeart/2005/8/layout/hProcess3"/>
-    <dgm:cxn modelId="{C1E50339-041E-4446-B43F-25EE50DFADDE}" type="presParOf" srcId="{93331CF4-A746-468B-8C11-9DFB8FD0B69F}" destId="{803B9503-1AAA-4EA3-9B7E-D4F71479314E}" srcOrd="0" destOrd="0" presId="urn:microsoft.com/office/officeart/2005/8/layout/hProcess3"/>
-    <dgm:cxn modelId="{7EFB2D92-D855-47AB-A001-C063CC91CDBA}" type="presParOf" srcId="{93331CF4-A746-468B-8C11-9DFB8FD0B69F}" destId="{1E1B630E-1F69-4595-BA1D-9A7FEB16E6A8}" srcOrd="1" destOrd="0" presId="urn:microsoft.com/office/officeart/2005/8/layout/hProcess3"/>
-    <dgm:cxn modelId="{7C0D9E85-EEB7-4DB5-B1EF-4637F00FF87D}" type="presParOf" srcId="{1E1B630E-1F69-4595-BA1D-9A7FEB16E6A8}" destId="{D526E0F7-09E1-4DCD-91E8-FAC97731F2D9}" srcOrd="0" destOrd="0" presId="urn:microsoft.com/office/officeart/2005/8/layout/hProcess3"/>
-    <dgm:cxn modelId="{EBE900F6-055B-4DE1-81FD-6227EA7ECF21}" type="presParOf" srcId="{1E1B630E-1F69-4595-BA1D-9A7FEB16E6A8}" destId="{466D25F0-B904-4ADB-91C7-37177886C6C8}" srcOrd="1" destOrd="0" presId="urn:microsoft.com/office/officeart/2005/8/layout/hProcess3"/>
-    <dgm:cxn modelId="{05CEDE68-9F17-4A14-93BD-93CF08C238C4}" type="presParOf" srcId="{466D25F0-B904-4ADB-91C7-37177886C6C8}" destId="{D8D03701-9574-4C4F-9B85-5400E00EC2F3}" srcOrd="0" destOrd="0" presId="urn:microsoft.com/office/officeart/2005/8/layout/hProcess3"/>
-    <dgm:cxn modelId="{58C70948-AE67-4FD7-9CDA-97C0E34986EF}" type="presParOf" srcId="{466D25F0-B904-4ADB-91C7-37177886C6C8}" destId="{A231D25E-5976-40F2-9B6B-157CD57E9B20}" srcOrd="1" destOrd="0" presId="urn:microsoft.com/office/officeart/2005/8/layout/hProcess3"/>
-    <dgm:cxn modelId="{87D23E3C-3B49-4787-A3E4-A717D14BA886}" type="presParOf" srcId="{466D25F0-B904-4ADB-91C7-37177886C6C8}" destId="{4568A4E5-D391-44CC-BA3F-F6D95CCD3275}" srcOrd="2" destOrd="0" presId="urn:microsoft.com/office/officeart/2005/8/layout/hProcess3"/>
-    <dgm:cxn modelId="{80A5BC3B-4DB6-4E48-8ACA-6253D812CE6F}" type="presParOf" srcId="{466D25F0-B904-4ADB-91C7-37177886C6C8}" destId="{B0305F19-7E63-4CC8-8173-75A89975F576}" srcOrd="3" destOrd="0" presId="urn:microsoft.com/office/officeart/2005/8/layout/hProcess3"/>
-    <dgm:cxn modelId="{04C2444E-483F-4D88-9794-E8A3FF0462E2}" type="presParOf" srcId="{466D25F0-B904-4ADB-91C7-37177886C6C8}" destId="{226C86D5-9BB0-4EC1-B9C1-712B8C4D493B}" srcOrd="4" destOrd="0" presId="urn:microsoft.com/office/officeart/2005/8/layout/hProcess3"/>
-    <dgm:cxn modelId="{332B720A-27C4-4945-90FC-2FE64469D0BB}" type="presParOf" srcId="{1E1B630E-1F69-4595-BA1D-9A7FEB16E6A8}" destId="{66A2FF6D-41D4-4D08-BB83-732AE7207FFF}" srcOrd="2" destOrd="0" presId="urn:microsoft.com/office/officeart/2005/8/layout/hProcess3"/>
-    <dgm:cxn modelId="{F5B8AB45-018B-43E4-8154-7882BF979CFE}" type="presParOf" srcId="{1E1B630E-1F69-4595-BA1D-9A7FEB16E6A8}" destId="{BBA45BFC-63EC-4325-B14B-3729D9A7AB18}" srcOrd="3" destOrd="0" presId="urn:microsoft.com/office/officeart/2005/8/layout/hProcess3"/>
-    <dgm:cxn modelId="{0C22A5ED-BE38-4C6D-8505-9F29CFCEF237}" type="presParOf" srcId="{BBA45BFC-63EC-4325-B14B-3729D9A7AB18}" destId="{ADCDFC54-634F-4F96-8543-CCC04CDCBD18}" srcOrd="0" destOrd="0" presId="urn:microsoft.com/office/officeart/2005/8/layout/hProcess3"/>
-    <dgm:cxn modelId="{D048A647-0B47-48A6-A185-2738413632A7}" type="presParOf" srcId="{BBA45BFC-63EC-4325-B14B-3729D9A7AB18}" destId="{4F2F3A95-9C38-4EC4-B68F-D999D42C91D2}" srcOrd="1" destOrd="0" presId="urn:microsoft.com/office/officeart/2005/8/layout/hProcess3"/>
-    <dgm:cxn modelId="{8579B864-E91C-4CBA-AFE4-9D1DFBE7293A}" type="presParOf" srcId="{BBA45BFC-63EC-4325-B14B-3729D9A7AB18}" destId="{092EA2D8-8BC2-4B93-AD16-16BB0CDA2AE9}" srcOrd="2" destOrd="0" presId="urn:microsoft.com/office/officeart/2005/8/layout/hProcess3"/>
-    <dgm:cxn modelId="{EC65260D-38B2-41F1-9A72-A935A7BC5AB8}" type="presParOf" srcId="{BBA45BFC-63EC-4325-B14B-3729D9A7AB18}" destId="{362A86AE-AA57-4995-9EFA-B0BF16E6D93A}" srcOrd="3" destOrd="0" presId="urn:microsoft.com/office/officeart/2005/8/layout/hProcess3"/>
-    <dgm:cxn modelId="{78C43E45-7C49-488B-B31F-585452F7044C}" type="presParOf" srcId="{BBA45BFC-63EC-4325-B14B-3729D9A7AB18}" destId="{3F49D824-B696-4EBD-8555-243546CB9537}" srcOrd="4" destOrd="0" presId="urn:microsoft.com/office/officeart/2005/8/layout/hProcess3"/>
-    <dgm:cxn modelId="{5573E3C6-E607-497A-8F8E-26E5BA5E90E4}" type="presParOf" srcId="{1E1B630E-1F69-4595-BA1D-9A7FEB16E6A8}" destId="{DD5F5E4F-4FC1-4555-97B2-958E38815AD7}" srcOrd="4" destOrd="0" presId="urn:microsoft.com/office/officeart/2005/8/layout/hProcess3"/>
-    <dgm:cxn modelId="{42398F44-25E2-4CCC-8833-B3EE24B7670D}" type="presParOf" srcId="{1E1B630E-1F69-4595-BA1D-9A7FEB16E6A8}" destId="{D4CE49E1-0ACB-4D10-AD21-8514FF1CE408}" srcOrd="5" destOrd="0" presId="urn:microsoft.com/office/officeart/2005/8/layout/hProcess3"/>
-    <dgm:cxn modelId="{2FB6A5CF-6B0E-4B3D-8D50-D171C79D9382}" type="presParOf" srcId="{D4CE49E1-0ACB-4D10-AD21-8514FF1CE408}" destId="{72F47416-D62E-48A7-8A0D-795886549DB1}" srcOrd="0" destOrd="0" presId="urn:microsoft.com/office/officeart/2005/8/layout/hProcess3"/>
-    <dgm:cxn modelId="{BC03D75A-4313-4606-AC1C-911738002F4C}" type="presParOf" srcId="{D4CE49E1-0ACB-4D10-AD21-8514FF1CE408}" destId="{C901A7DC-005E-40D8-974D-25AA37B3523A}" srcOrd="1" destOrd="0" presId="urn:microsoft.com/office/officeart/2005/8/layout/hProcess3"/>
-    <dgm:cxn modelId="{0D4E1AC2-EFC6-46CA-8532-71C55B09BD8A}" type="presParOf" srcId="{D4CE49E1-0ACB-4D10-AD21-8514FF1CE408}" destId="{AAE58E6F-2055-4915-8D22-282D085D6AFA}" srcOrd="2" destOrd="0" presId="urn:microsoft.com/office/officeart/2005/8/layout/hProcess3"/>
-    <dgm:cxn modelId="{9FA10C19-037A-4389-A494-388F197022F5}" type="presParOf" srcId="{D4CE49E1-0ACB-4D10-AD21-8514FF1CE408}" destId="{D8F016AF-8D41-4027-B970-A918BAB7BC56}" srcOrd="3" destOrd="0" presId="urn:microsoft.com/office/officeart/2005/8/layout/hProcess3"/>
-    <dgm:cxn modelId="{738B4EA6-E750-4B63-8BB5-3C298BB31E40}" type="presParOf" srcId="{D4CE49E1-0ACB-4D10-AD21-8514FF1CE408}" destId="{8A30E715-6168-49DC-AB6B-CE2665F37521}" srcOrd="4" destOrd="0" presId="urn:microsoft.com/office/officeart/2005/8/layout/hProcess3"/>
-    <dgm:cxn modelId="{25511357-3808-40DC-8E65-F0D60460DD70}" type="presParOf" srcId="{1E1B630E-1F69-4595-BA1D-9A7FEB16E6A8}" destId="{9C877AC0-21E0-4EAF-9537-87730B00AF4C}" srcOrd="6" destOrd="0" presId="urn:microsoft.com/office/officeart/2005/8/layout/hProcess3"/>
-    <dgm:cxn modelId="{DB79449E-7805-43D9-8521-9B5046C9290E}" type="presParOf" srcId="{1E1B630E-1F69-4595-BA1D-9A7FEB16E6A8}" destId="{69581A74-3329-4467-BC8C-5A0085EDF3E3}" srcOrd="7" destOrd="0" presId="urn:microsoft.com/office/officeart/2005/8/layout/hProcess3"/>
-    <dgm:cxn modelId="{E1A6A24E-9B0A-492D-B993-49ADBDE553A8}" type="presParOf" srcId="{69581A74-3329-4467-BC8C-5A0085EDF3E3}" destId="{93E69C8E-EE66-45B7-9D80-25683CDAAC1D}" srcOrd="0" destOrd="0" presId="urn:microsoft.com/office/officeart/2005/8/layout/hProcess3"/>
-    <dgm:cxn modelId="{12B085CC-CD25-4077-9C39-1D86A8974AD4}" type="presParOf" srcId="{69581A74-3329-4467-BC8C-5A0085EDF3E3}" destId="{095D2C15-6F43-4DFE-9E36-2A77E47B4940}" srcOrd="1" destOrd="0" presId="urn:microsoft.com/office/officeart/2005/8/layout/hProcess3"/>
-    <dgm:cxn modelId="{FEF7F85D-8FFB-4F45-A1C4-57391D93E837}" type="presParOf" srcId="{69581A74-3329-4467-BC8C-5A0085EDF3E3}" destId="{5C4173FF-ABB6-4C99-BB21-34BADAEF8B83}" srcOrd="2" destOrd="0" presId="urn:microsoft.com/office/officeart/2005/8/layout/hProcess3"/>
-    <dgm:cxn modelId="{E65FFD9F-172B-434B-9B07-8C48CF92FBE8}" type="presParOf" srcId="{69581A74-3329-4467-BC8C-5A0085EDF3E3}" destId="{4496D045-8E44-4A0A-AA82-BF2D179BD521}" srcOrd="3" destOrd="0" presId="urn:microsoft.com/office/officeart/2005/8/layout/hProcess3"/>
-    <dgm:cxn modelId="{61737C35-40C9-4311-B58A-544ABC16EE0A}" type="presParOf" srcId="{69581A74-3329-4467-BC8C-5A0085EDF3E3}" destId="{9D196266-D08A-4337-A122-6F206D0BF9FE}" srcOrd="4" destOrd="0" presId="urn:microsoft.com/office/officeart/2005/8/layout/hProcess3"/>
-    <dgm:cxn modelId="{E0A36838-64DF-4D81-BE82-D0CB850CB6D2}" type="presParOf" srcId="{1E1B630E-1F69-4595-BA1D-9A7FEB16E6A8}" destId="{DEC3B485-459C-4634-B5AD-AB0B9D700B59}" srcOrd="8" destOrd="0" presId="urn:microsoft.com/office/officeart/2005/8/layout/hProcess3"/>
-    <dgm:cxn modelId="{23EF1C17-8187-4EA8-88FB-B89724832128}" type="presParOf" srcId="{1E1B630E-1F69-4595-BA1D-9A7FEB16E6A8}" destId="{A5A1F82D-3522-4B2C-A3EF-1EA0C8F5AF86}" srcOrd="9" destOrd="0" presId="urn:microsoft.com/office/officeart/2005/8/layout/hProcess3"/>
-    <dgm:cxn modelId="{F0EB545C-4A08-4DB8-80A0-CB359F7A291C}" type="presParOf" srcId="{1E1B630E-1F69-4595-BA1D-9A7FEB16E6A8}" destId="{C137D2AF-0976-48BA-98AB-ACD96457D15F}" srcOrd="10" destOrd="0" presId="urn:microsoft.com/office/officeart/2005/8/layout/hProcess3"/>
+    <dgm:cxn modelId="{D3C6A5F9-4C74-43B1-85F6-E18E418E9456}" type="presOf" srcId="{D37B0AFD-F07E-4E23-BCF7-E8F866745BE5}" destId="{8A30E715-6168-49DC-AB6B-CE2665F37521}" srcOrd="0" destOrd="2" presId="urn:microsoft.com/office/officeart/2005/8/layout/hProcess3"/>
+    <dgm:cxn modelId="{BA1F1789-C4B2-4BD9-8C76-90593B21121A}" type="presParOf" srcId="{93331CF4-A746-468B-8C11-9DFB8FD0B69F}" destId="{803B9503-1AAA-4EA3-9B7E-D4F71479314E}" srcOrd="0" destOrd="0" presId="urn:microsoft.com/office/officeart/2005/8/layout/hProcess3"/>
+    <dgm:cxn modelId="{4F4F0316-17B4-4A1E-9F5E-F894BBF699F7}" type="presParOf" srcId="{93331CF4-A746-468B-8C11-9DFB8FD0B69F}" destId="{1E1B630E-1F69-4595-BA1D-9A7FEB16E6A8}" srcOrd="1" destOrd="0" presId="urn:microsoft.com/office/officeart/2005/8/layout/hProcess3"/>
+    <dgm:cxn modelId="{B9DE55CD-8555-4A39-AB6C-BAF475AB70AA}" type="presParOf" srcId="{1E1B630E-1F69-4595-BA1D-9A7FEB16E6A8}" destId="{D526E0F7-09E1-4DCD-91E8-FAC97731F2D9}" srcOrd="0" destOrd="0" presId="urn:microsoft.com/office/officeart/2005/8/layout/hProcess3"/>
+    <dgm:cxn modelId="{4E334D04-3D3A-48FF-AA59-C478833819B8}" type="presParOf" srcId="{1E1B630E-1F69-4595-BA1D-9A7FEB16E6A8}" destId="{466D25F0-B904-4ADB-91C7-37177886C6C8}" srcOrd="1" destOrd="0" presId="urn:microsoft.com/office/officeart/2005/8/layout/hProcess3"/>
+    <dgm:cxn modelId="{1FCC6A4D-D930-451E-BB1D-2F92CF767008}" type="presParOf" srcId="{466D25F0-B904-4ADB-91C7-37177886C6C8}" destId="{D8D03701-9574-4C4F-9B85-5400E00EC2F3}" srcOrd="0" destOrd="0" presId="urn:microsoft.com/office/officeart/2005/8/layout/hProcess3"/>
+    <dgm:cxn modelId="{DAE8E943-5C24-4AEA-8B63-4E470787D7ED}" type="presParOf" srcId="{466D25F0-B904-4ADB-91C7-37177886C6C8}" destId="{A231D25E-5976-40F2-9B6B-157CD57E9B20}" srcOrd="1" destOrd="0" presId="urn:microsoft.com/office/officeart/2005/8/layout/hProcess3"/>
+    <dgm:cxn modelId="{8C9277F3-B572-4F83-AE31-E5933B501EC7}" type="presParOf" srcId="{466D25F0-B904-4ADB-91C7-37177886C6C8}" destId="{4568A4E5-D391-44CC-BA3F-F6D95CCD3275}" srcOrd="2" destOrd="0" presId="urn:microsoft.com/office/officeart/2005/8/layout/hProcess3"/>
+    <dgm:cxn modelId="{538ACB77-23E6-4FF0-B679-C748E08F2DBF}" type="presParOf" srcId="{466D25F0-B904-4ADB-91C7-37177886C6C8}" destId="{B0305F19-7E63-4CC8-8173-75A89975F576}" srcOrd="3" destOrd="0" presId="urn:microsoft.com/office/officeart/2005/8/layout/hProcess3"/>
+    <dgm:cxn modelId="{0C67F281-F488-4AAF-95E7-6C7DB4C619B7}" type="presParOf" srcId="{466D25F0-B904-4ADB-91C7-37177886C6C8}" destId="{226C86D5-9BB0-4EC1-B9C1-712B8C4D493B}" srcOrd="4" destOrd="0" presId="urn:microsoft.com/office/officeart/2005/8/layout/hProcess3"/>
+    <dgm:cxn modelId="{EF9B77C9-EB94-4954-8EAE-B32A3EBC0FC5}" type="presParOf" srcId="{1E1B630E-1F69-4595-BA1D-9A7FEB16E6A8}" destId="{66A2FF6D-41D4-4D08-BB83-732AE7207FFF}" srcOrd="2" destOrd="0" presId="urn:microsoft.com/office/officeart/2005/8/layout/hProcess3"/>
+    <dgm:cxn modelId="{68C46861-9F69-47B4-963D-2723821359E4}" type="presParOf" srcId="{1E1B630E-1F69-4595-BA1D-9A7FEB16E6A8}" destId="{D4CE49E1-0ACB-4D10-AD21-8514FF1CE408}" srcOrd="3" destOrd="0" presId="urn:microsoft.com/office/officeart/2005/8/layout/hProcess3"/>
+    <dgm:cxn modelId="{5DECF59E-AD88-427E-9C90-EBA2F67380D1}" type="presParOf" srcId="{D4CE49E1-0ACB-4D10-AD21-8514FF1CE408}" destId="{72F47416-D62E-48A7-8A0D-795886549DB1}" srcOrd="0" destOrd="0" presId="urn:microsoft.com/office/officeart/2005/8/layout/hProcess3"/>
+    <dgm:cxn modelId="{9970962C-6592-4D35-A283-F5BA06F121C6}" type="presParOf" srcId="{D4CE49E1-0ACB-4D10-AD21-8514FF1CE408}" destId="{C901A7DC-005E-40D8-974D-25AA37B3523A}" srcOrd="1" destOrd="0" presId="urn:microsoft.com/office/officeart/2005/8/layout/hProcess3"/>
+    <dgm:cxn modelId="{25B98852-0DF6-4F38-86ED-1FBB09448BBF}" type="presParOf" srcId="{D4CE49E1-0ACB-4D10-AD21-8514FF1CE408}" destId="{AAE58E6F-2055-4915-8D22-282D085D6AFA}" srcOrd="2" destOrd="0" presId="urn:microsoft.com/office/officeart/2005/8/layout/hProcess3"/>
+    <dgm:cxn modelId="{2DE66582-BA0B-4AE9-AE49-1BCBB8F5D94E}" type="presParOf" srcId="{D4CE49E1-0ACB-4D10-AD21-8514FF1CE408}" destId="{D8F016AF-8D41-4027-B970-A918BAB7BC56}" srcOrd="3" destOrd="0" presId="urn:microsoft.com/office/officeart/2005/8/layout/hProcess3"/>
+    <dgm:cxn modelId="{5071E29A-7458-4AFD-9B24-94AE48E87600}" type="presParOf" srcId="{D4CE49E1-0ACB-4D10-AD21-8514FF1CE408}" destId="{8A30E715-6168-49DC-AB6B-CE2665F37521}" srcOrd="4" destOrd="0" presId="urn:microsoft.com/office/officeart/2005/8/layout/hProcess3"/>
+    <dgm:cxn modelId="{6FA06A43-B36C-4694-9D89-5EA358294156}" type="presParOf" srcId="{1E1B630E-1F69-4595-BA1D-9A7FEB16E6A8}" destId="{9C877AC0-21E0-4EAF-9537-87730B00AF4C}" srcOrd="4" destOrd="0" presId="urn:microsoft.com/office/officeart/2005/8/layout/hProcess3"/>
+    <dgm:cxn modelId="{0934B750-C35D-4C21-9DC8-190A4D12C969}" type="presParOf" srcId="{1E1B630E-1F69-4595-BA1D-9A7FEB16E6A8}" destId="{BBA45BFC-63EC-4325-B14B-3729D9A7AB18}" srcOrd="5" destOrd="0" presId="urn:microsoft.com/office/officeart/2005/8/layout/hProcess3"/>
+    <dgm:cxn modelId="{7E760BDB-D02A-4908-A3A4-31B529D00FBD}" type="presParOf" srcId="{BBA45BFC-63EC-4325-B14B-3729D9A7AB18}" destId="{ADCDFC54-634F-4F96-8543-CCC04CDCBD18}" srcOrd="0" destOrd="0" presId="urn:microsoft.com/office/officeart/2005/8/layout/hProcess3"/>
+    <dgm:cxn modelId="{C04D9CA9-0315-4019-BB63-4BAC17AE1F10}" type="presParOf" srcId="{BBA45BFC-63EC-4325-B14B-3729D9A7AB18}" destId="{4F2F3A95-9C38-4EC4-B68F-D999D42C91D2}" srcOrd="1" destOrd="0" presId="urn:microsoft.com/office/officeart/2005/8/layout/hProcess3"/>
+    <dgm:cxn modelId="{DB0FBA11-92AE-48A7-8421-1B99BEBE3BDB}" type="presParOf" srcId="{BBA45BFC-63EC-4325-B14B-3729D9A7AB18}" destId="{092EA2D8-8BC2-4B93-AD16-16BB0CDA2AE9}" srcOrd="2" destOrd="0" presId="urn:microsoft.com/office/officeart/2005/8/layout/hProcess3"/>
+    <dgm:cxn modelId="{ED0DCC3A-1F45-4EEB-99AB-656EE2714EB4}" type="presParOf" srcId="{BBA45BFC-63EC-4325-B14B-3729D9A7AB18}" destId="{362A86AE-AA57-4995-9EFA-B0BF16E6D93A}" srcOrd="3" destOrd="0" presId="urn:microsoft.com/office/officeart/2005/8/layout/hProcess3"/>
+    <dgm:cxn modelId="{66C2CC8C-F28C-44C2-A0C9-B2B310375F7D}" type="presParOf" srcId="{BBA45BFC-63EC-4325-B14B-3729D9A7AB18}" destId="{3F49D824-B696-4EBD-8555-243546CB9537}" srcOrd="4" destOrd="0" presId="urn:microsoft.com/office/officeart/2005/8/layout/hProcess3"/>
+    <dgm:cxn modelId="{09BD5D7D-CDF0-43FC-A8CF-1286BF22A481}" type="presParOf" srcId="{1E1B630E-1F69-4595-BA1D-9A7FEB16E6A8}" destId="{DD5F5E4F-4FC1-4555-97B2-958E38815AD7}" srcOrd="6" destOrd="0" presId="urn:microsoft.com/office/officeart/2005/8/layout/hProcess3"/>
+    <dgm:cxn modelId="{AFA11343-BCFE-4EB8-A972-905F15EFCD61}" type="presParOf" srcId="{1E1B630E-1F69-4595-BA1D-9A7FEB16E6A8}" destId="{69581A74-3329-4467-BC8C-5A0085EDF3E3}" srcOrd="7" destOrd="0" presId="urn:microsoft.com/office/officeart/2005/8/layout/hProcess3"/>
+    <dgm:cxn modelId="{4DD39F6E-E59A-4B42-904A-10CE0D7D4046}" type="presParOf" srcId="{69581A74-3329-4467-BC8C-5A0085EDF3E3}" destId="{93E69C8E-EE66-45B7-9D80-25683CDAAC1D}" srcOrd="0" destOrd="0" presId="urn:microsoft.com/office/officeart/2005/8/layout/hProcess3"/>
+    <dgm:cxn modelId="{084DCBCF-CC00-4162-921B-C7BD68A27D7A}" type="presParOf" srcId="{69581A74-3329-4467-BC8C-5A0085EDF3E3}" destId="{095D2C15-6F43-4DFE-9E36-2A77E47B4940}" srcOrd="1" destOrd="0" presId="urn:microsoft.com/office/officeart/2005/8/layout/hProcess3"/>
+    <dgm:cxn modelId="{95CE4C7D-8D8E-4BE7-A0C1-DC198A60E631}" type="presParOf" srcId="{69581A74-3329-4467-BC8C-5A0085EDF3E3}" destId="{5C4173FF-ABB6-4C99-BB21-34BADAEF8B83}" srcOrd="2" destOrd="0" presId="urn:microsoft.com/office/officeart/2005/8/layout/hProcess3"/>
+    <dgm:cxn modelId="{CB1F7B25-E1E9-4E9B-BEA7-FC5C03128CBD}" type="presParOf" srcId="{69581A74-3329-4467-BC8C-5A0085EDF3E3}" destId="{4496D045-8E44-4A0A-AA82-BF2D179BD521}" srcOrd="3" destOrd="0" presId="urn:microsoft.com/office/officeart/2005/8/layout/hProcess3"/>
+    <dgm:cxn modelId="{B6D53B35-7E46-4766-99EC-A7E44547150F}" type="presParOf" srcId="{69581A74-3329-4467-BC8C-5A0085EDF3E3}" destId="{9D196266-D08A-4337-A122-6F206D0BF9FE}" srcOrd="4" destOrd="0" presId="urn:microsoft.com/office/officeart/2005/8/layout/hProcess3"/>
+    <dgm:cxn modelId="{5A649C91-C079-4134-B15E-7755590A5338}" type="presParOf" srcId="{1E1B630E-1F69-4595-BA1D-9A7FEB16E6A8}" destId="{DEC3B485-459C-4634-B5AD-AB0B9D700B59}" srcOrd="8" destOrd="0" presId="urn:microsoft.com/office/officeart/2005/8/layout/hProcess3"/>
+    <dgm:cxn modelId="{EF502531-B13C-4545-801C-F065A4731A6F}" type="presParOf" srcId="{1E1B630E-1F69-4595-BA1D-9A7FEB16E6A8}" destId="{A5A1F82D-3522-4B2C-A3EF-1EA0C8F5AF86}" srcOrd="9" destOrd="0" presId="urn:microsoft.com/office/officeart/2005/8/layout/hProcess3"/>
+    <dgm:cxn modelId="{6672D42A-85C5-4624-91EF-C790FEC154E0}" type="presParOf" srcId="{1E1B630E-1F69-4595-BA1D-9A7FEB16E6A8}" destId="{C137D2AF-0976-48BA-98AB-ACD96457D15F}" srcOrd="10" destOrd="0" presId="urn:microsoft.com/office/officeart/2005/8/layout/hProcess3"/>
   </dgm:cxnLst>
   <dgm:bg/>
   <dgm:whole/>
@@ -7272,8 +7314,8 @@
             <a:buNone/>
           </a:pPr>
           <a:r>
-            <a:rPr lang="it-IT" sz="1600" kern="1200"/>
-            <a:t>Analisi del sentiment di un dataset massivo eterogeneo composto da recensioni utente su venti applicazioni distinte, estratte dal Google Play StoreTestare scalabilità replica e fault tolerance</a:t>
+            <a:rPr lang="it-IT" sz="1600" kern="1200" dirty="0"/>
+            <a:t>Analisi del sentiment di un dataset massivo eterogeneo composto da recensioni utente su venti applicazioni distinte, estratte dal Google Play Store</a:t>
           </a:r>
           <a:endParaRPr lang="en-US" sz="1600" kern="1200" dirty="0"/>
         </a:p>
@@ -7572,8 +7614,8 @@
             <a:buNone/>
           </a:pPr>
           <a:r>
-            <a:rPr lang="it-IT" sz="1600" kern="1200"/>
-            <a:t>progettare, implementare e testare una pipeline di Big Data Analytics utilizzando Apache Spark in un ambiente distribuito su Cloud Azure effettuando anche benchmark su prestazioni e scalabilità</a:t>
+            <a:rPr lang="it-IT" sz="1600" kern="1200" dirty="0"/>
+            <a:t>progettare, implementare e testare una pipeline di Big Data Analytics utilizzando Apache Spark in un ambiente distribuito su Cloud Azure effettuando benchmark su prestazioni e scalabilità</a:t>
           </a:r>
           <a:endParaRPr lang="en-US" sz="1600" kern="1200" dirty="0"/>
         </a:p>
@@ -8018,14 +8060,14 @@
             <a:buNone/>
           </a:pPr>
           <a:r>
-            <a:rPr lang="it-IT" sz="1600" b="1" kern="1200"/>
+            <a:rPr lang="it-IT" sz="1600" b="1" kern="1200" dirty="0"/>
             <a:t>Motore di calcolo: </a:t>
           </a:r>
           <a:r>
-            <a:rPr lang="it-IT" sz="1600" kern="1200"/>
+            <a:rPr lang="it-IT" sz="1600" kern="1200" dirty="0"/>
             <a:t>Apache Spark 3.5.0</a:t>
           </a:r>
-          <a:endParaRPr lang="en-US" sz="1600" kern="1200"/>
+          <a:endParaRPr lang="en-US" sz="1600" kern="1200" dirty="0"/>
         </a:p>
         <a:p>
           <a:pPr marL="0" lvl="0" indent="0" algn="l" defTabSz="711200">
@@ -8063,14 +8105,22 @@
             <a:buNone/>
           </a:pPr>
           <a:r>
-            <a:rPr lang="it-IT" sz="1600" b="1" kern="1200"/>
+            <a:rPr lang="it-IT" sz="1600" b="1" kern="1200" dirty="0"/>
             <a:t>Linguaggio:</a:t>
           </a:r>
           <a:r>
-            <a:rPr lang="it-IT" sz="1600" kern="1200"/>
-            <a:t> Python per la definizione della pipeline NLP.</a:t>
+            <a:rPr lang="it-IT" sz="1600" kern="1200" dirty="0"/>
+            <a:t> Python per la definizione della pipeline NLP e la data </a:t>
           </a:r>
-          <a:endParaRPr lang="en-US" sz="1600" kern="1200"/>
+          <a:r>
+            <a:rPr lang="it-IT" sz="1600" kern="1200" dirty="0" err="1"/>
+            <a:t>visuallization</a:t>
+          </a:r>
+          <a:r>
+            <a:rPr lang="it-IT" sz="1600" kern="1200" dirty="0"/>
+            <a:t>.</a:t>
+          </a:r>
+          <a:endParaRPr lang="en-US" sz="1600" kern="1200" dirty="0"/>
         </a:p>
       </dsp:txBody>
       <dsp:txXfrm>
@@ -8389,7 +8439,7 @@
             <a:buNone/>
           </a:pPr>
           <a:r>
-            <a:rPr lang="it-IT" sz="1800" b="1" kern="1200"/>
+            <a:rPr lang="it-IT" sz="1800" b="1" kern="1200" dirty="0"/>
             <a:t>Ingestione Dati</a:t>
           </a:r>
           <a:endParaRPr lang="it-IT" sz="1800" kern="1200" dirty="0"/>
@@ -8431,14 +8481,13 @@
             <a:buChar char="•"/>
           </a:pPr>
           <a:r>
-            <a:rPr lang="it-IT" sz="1400" b="1" kern="1200"/>
+            <a:rPr lang="it-IT" sz="1400" b="1" kern="1200" dirty="0"/>
             <a:t>Action:</a:t>
           </a:r>
           <a:r>
-            <a:rPr lang="it-IT" sz="1400" kern="1200"/>
+            <a:rPr lang="it-IT" sz="1400" kern="1200" dirty="0"/>
             <a:t> Unificazione schema e normalizzazione</a:t>
           </a:r>
-          <a:endParaRPr lang="it-IT" sz="1400" kern="1200" dirty="0"/>
         </a:p>
         <a:p>
           <a:pPr marL="114300" lvl="1" indent="-114300" algn="l" defTabSz="622300">
@@ -8454,24 +8503,23 @@
             <a:buChar char="•"/>
           </a:pPr>
           <a:r>
-            <a:rPr lang="it-IT" sz="1400" b="1" kern="1200"/>
+            <a:rPr lang="it-IT" sz="1400" b="1" kern="1200" dirty="0"/>
             <a:t>Arricchimento:</a:t>
           </a:r>
           <a:r>
-            <a:rPr lang="it-IT" sz="1400" kern="1200"/>
-            <a:t> Tagging della sorgente </a:t>
+            <a:rPr lang="it-IT" sz="1400" kern="1200" dirty="0"/>
+            <a:t> aggiunta della sorgente </a:t>
           </a:r>
           <a:r>
-            <a:rPr lang="it-IT" sz="1400" kern="1200">
+            <a:rPr lang="it-IT" sz="1400" kern="1200" dirty="0" err="1">
               <a:latin typeface="Courier New" panose="02070309020205020404" pitchFamily="49" charset="0"/>
             </a:rPr>
             <a:t>app_name</a:t>
           </a:r>
           <a:r>
-            <a:rPr lang="it-IT" sz="1400" kern="1200"/>
+            <a:rPr lang="it-IT" sz="1400" kern="1200" dirty="0"/>
             <a:t> per tracciabilità</a:t>
           </a:r>
-          <a:endParaRPr lang="it-IT" sz="1400" kern="1200" dirty="0"/>
         </a:p>
       </dsp:txBody>
       <dsp:txXfrm>
@@ -8775,13 +8823,14 @@
             <a:buChar char="•"/>
           </a:pPr>
           <a:r>
-            <a:rPr lang="it-IT" sz="1400" b="1" kern="1200"/>
-            <a:t>Vantaggio:</a:t>
+            <a:rPr lang="it-IT" sz="1400" b="1" kern="1200" dirty="0"/>
+            <a:t>Vantaggio: </a:t>
           </a:r>
           <a:r>
-            <a:rPr lang="it-IT" sz="1400" kern="1200"/>
-            <a:t> Abilitazione Projection Pushdown</a:t>
+            <a:rPr lang="it-IT" sz="1400" b="0" kern="1200" dirty="0"/>
+            <a:t>conversione in un formato più adatto a questo tipo di analisi</a:t>
           </a:r>
+          <a:endParaRPr lang="it-IT" sz="1400" kern="1200" dirty="0"/>
         </a:p>
       </dsp:txBody>
       <dsp:txXfrm>
@@ -9099,6 +9148,42 @@
             <a:rPr lang="en-US" sz="1700" b="1" kern="1200" dirty="0" err="1"/>
             <a:t>esportazione</a:t>
           </a:r>
+          <a:r>
+            <a:rPr lang="en-US" sz="1700" b="1" kern="1200" dirty="0"/>
+            <a:t>: </a:t>
+          </a:r>
+          <a:r>
+            <a:rPr lang="en-US" sz="1700" b="0" kern="1200" dirty="0" err="1"/>
+            <a:t>esportazione</a:t>
+          </a:r>
+          <a:r>
+            <a:rPr lang="en-US" sz="1700" b="0" kern="1200" dirty="0"/>
+            <a:t> </a:t>
+          </a:r>
+          <a:r>
+            <a:rPr lang="en-US" sz="1700" b="0" kern="1200" dirty="0" err="1"/>
+            <a:t>dei</a:t>
+          </a:r>
+          <a:r>
+            <a:rPr lang="en-US" sz="1700" b="0" kern="1200" dirty="0"/>
+            <a:t> </a:t>
+          </a:r>
+          <a:r>
+            <a:rPr lang="en-US" sz="1700" b="0" kern="1200" dirty="0" err="1"/>
+            <a:t>risultati</a:t>
+          </a:r>
+          <a:r>
+            <a:rPr lang="en-US" sz="1700" b="0" kern="1200" dirty="0"/>
+            <a:t> in </a:t>
+          </a:r>
+          <a:r>
+            <a:rPr lang="en-US" sz="1700" b="0" kern="1200" dirty="0" err="1"/>
+            <a:t>formato</a:t>
+          </a:r>
+          <a:r>
+            <a:rPr lang="en-US" sz="1700" b="0" kern="1200" dirty="0"/>
+            <a:t> csv</a:t>
+          </a:r>
           <a:endParaRPr lang="en-US" sz="1700" b="1" kern="1200" dirty="0"/>
         </a:p>
       </dsp:txBody>
@@ -9168,6 +9253,155 @@
         <a:ext cx="2113311" cy="1088163"/>
       </dsp:txXfrm>
     </dsp:sp>
+    <dsp:sp modelId="{3F49D824-B696-4EBD-8555-243546CB9537}">
+      <dsp:nvSpPr>
+        <dsp:cNvPr id="0" name=""/>
+        <dsp:cNvSpPr/>
+      </dsp:nvSpPr>
+      <dsp:spPr>
+        <a:xfrm>
+          <a:off x="6022647" y="2055158"/>
+          <a:ext cx="2113311" cy="2920500"/>
+        </a:xfrm>
+        <a:prstGeom prst="rect">
+          <a:avLst/>
+        </a:prstGeom>
+        <a:noFill/>
+        <a:ln>
+          <a:noFill/>
+        </a:ln>
+        <a:effectLst/>
+      </dsp:spPr>
+      <dsp:style>
+        <a:lnRef idx="0">
+          <a:scrgbClr r="0" g="0" b="0"/>
+        </a:lnRef>
+        <a:fillRef idx="0">
+          <a:scrgbClr r="0" g="0" b="0"/>
+        </a:fillRef>
+        <a:effectRef idx="0">
+          <a:scrgbClr r="0" g="0" b="0"/>
+        </a:effectRef>
+        <a:fontRef idx="minor"/>
+      </dsp:style>
+      <dsp:txBody>
+        <a:bodyPr spcFirstLastPara="0" vert="horz" wrap="square" lIns="0" tIns="0" rIns="0" bIns="0" numCol="1" spcCol="1270" anchor="t" anchorCtr="0">
+          <a:noAutofit/>
+        </a:bodyPr>
+        <a:lstStyle/>
+        <a:p>
+          <a:pPr marL="171450" lvl="1" indent="-171450" algn="l" defTabSz="755650">
+            <a:lnSpc>
+              <a:spcPct val="90000"/>
+            </a:lnSpc>
+            <a:spcBef>
+              <a:spcPct val="0"/>
+            </a:spcBef>
+            <a:spcAft>
+              <a:spcPct val="15000"/>
+            </a:spcAft>
+            <a:buChar char="•"/>
+          </a:pPr>
+          <a:r>
+            <a:rPr lang="it-IT" sz="1700" b="1" kern="1200" dirty="0"/>
+            <a:t>Approccio: </a:t>
+          </a:r>
+          <a:r>
+            <a:rPr lang="it-IT" sz="1700" b="0" kern="1200" dirty="0"/>
+            <a:t>suddividere il testo delle recensioni in coppie di parole</a:t>
+          </a:r>
+          <a:endParaRPr lang="en-US" sz="1700" kern="1200" dirty="0"/>
+        </a:p>
+        <a:p>
+          <a:pPr marL="171450" lvl="1" indent="-171450" algn="l" defTabSz="755650">
+            <a:lnSpc>
+              <a:spcPct val="90000"/>
+            </a:lnSpc>
+            <a:spcBef>
+              <a:spcPct val="0"/>
+            </a:spcBef>
+            <a:spcAft>
+              <a:spcPct val="15000"/>
+            </a:spcAft>
+            <a:buChar char="•"/>
+          </a:pPr>
+          <a:r>
+            <a:rPr lang="it-IT" sz="1700" b="1" kern="1200" dirty="0"/>
+            <a:t>Motivazione:</a:t>
+          </a:r>
+          <a:r>
+            <a:rPr lang="it-IT" sz="1700" kern="1200" dirty="0"/>
+            <a:t> Preservare il contesto semantico</a:t>
+          </a:r>
+          <a:endParaRPr lang="en-US" sz="1700" kern="1200" dirty="0"/>
+        </a:p>
+      </dsp:txBody>
+      <dsp:txXfrm>
+        <a:off x="6022647" y="2055158"/>
+        <a:ext cx="2113311" cy="2920500"/>
+      </dsp:txXfrm>
+    </dsp:sp>
+    <dsp:sp modelId="{4F2F3A95-9C38-4EC4-B68F-D999D42C91D2}">
+      <dsp:nvSpPr>
+        <dsp:cNvPr id="0" name=""/>
+        <dsp:cNvSpPr/>
+      </dsp:nvSpPr>
+      <dsp:spPr>
+        <a:xfrm>
+          <a:off x="6022647" y="858178"/>
+          <a:ext cx="2113311" cy="1088163"/>
+        </a:xfrm>
+        <a:prstGeom prst="rect">
+          <a:avLst/>
+        </a:prstGeom>
+        <a:noFill/>
+        <a:ln>
+          <a:noFill/>
+        </a:ln>
+        <a:effectLst/>
+      </dsp:spPr>
+      <dsp:style>
+        <a:lnRef idx="0">
+          <a:scrgbClr r="0" g="0" b="0"/>
+        </a:lnRef>
+        <a:fillRef idx="0">
+          <a:scrgbClr r="0" g="0" b="0"/>
+        </a:fillRef>
+        <a:effectRef idx="0">
+          <a:scrgbClr r="0" g="0" b="0"/>
+        </a:effectRef>
+        <a:fontRef idx="minor"/>
+      </dsp:style>
+      <dsp:txBody>
+        <a:bodyPr spcFirstLastPara="0" vert="horz" wrap="square" lIns="0" tIns="223520" rIns="0" bIns="223520" numCol="1" spcCol="1270" anchor="ctr" anchorCtr="0">
+          <a:noAutofit/>
+        </a:bodyPr>
+        <a:lstStyle/>
+        <a:p>
+          <a:pPr marL="0" lvl="0" indent="0" algn="l" defTabSz="977900">
+            <a:lnSpc>
+              <a:spcPct val="90000"/>
+            </a:lnSpc>
+            <a:spcBef>
+              <a:spcPct val="0"/>
+            </a:spcBef>
+            <a:spcAft>
+              <a:spcPct val="35000"/>
+            </a:spcAft>
+            <a:buNone/>
+          </a:pPr>
+          <a:r>
+            <a:rPr lang="it-IT" sz="2200" b="1" kern="1200" dirty="0"/>
+            <a:t>Estrazione dei bigrammi</a:t>
+          </a:r>
+          <a:endParaRPr lang="en-US" sz="2200" kern="1200" dirty="0"/>
+        </a:p>
+      </dsp:txBody>
+      <dsp:txXfrm>
+        <a:off x="6022647" y="858178"/>
+        <a:ext cx="2113311" cy="1088163"/>
+      </dsp:txXfrm>
+    </dsp:sp>
     <dsp:sp modelId="{8A30E715-6168-49DC-AB6B-CE2665F37521}">
       <dsp:nvSpPr>
         <dsp:cNvPr id="0" name=""/>
@@ -9175,7 +9409,7 @@
       </dsp:nvSpPr>
       <dsp:spPr>
         <a:xfrm>
-          <a:off x="6022647" y="2055158"/>
+          <a:off x="3486674" y="2055158"/>
           <a:ext cx="2113311" cy="2920500"/>
         </a:xfrm>
         <a:prstGeom prst="rect">
@@ -9275,7 +9509,7 @@
         </a:p>
       </dsp:txBody>
       <dsp:txXfrm>
-        <a:off x="6022647" y="2055158"/>
+        <a:off x="3486674" y="2055158"/>
         <a:ext cx="2113311" cy="2920500"/>
       </dsp:txXfrm>
     </dsp:sp>
@@ -9286,7 +9520,7 @@
       </dsp:nvSpPr>
       <dsp:spPr>
         <a:xfrm>
-          <a:off x="6022647" y="858178"/>
+          <a:off x="3486674" y="858178"/>
           <a:ext cx="2113311" cy="1088163"/>
         </a:xfrm>
         <a:prstGeom prst="rect">
@@ -9339,155 +9573,6 @@
           <a:r>
             <a:rPr lang="it-IT" sz="2200" b="1" kern="1200" dirty="0" err="1"/>
             <a:t>Removal</a:t>
-          </a:r>
-          <a:endParaRPr lang="en-US" sz="2200" kern="1200" dirty="0"/>
-        </a:p>
-      </dsp:txBody>
-      <dsp:txXfrm>
-        <a:off x="6022647" y="858178"/>
-        <a:ext cx="2113311" cy="1088163"/>
-      </dsp:txXfrm>
-    </dsp:sp>
-    <dsp:sp modelId="{3F49D824-B696-4EBD-8555-243546CB9537}">
-      <dsp:nvSpPr>
-        <dsp:cNvPr id="0" name=""/>
-        <dsp:cNvSpPr/>
-      </dsp:nvSpPr>
-      <dsp:spPr>
-        <a:xfrm>
-          <a:off x="3486674" y="2055158"/>
-          <a:ext cx="2113311" cy="2920500"/>
-        </a:xfrm>
-        <a:prstGeom prst="rect">
-          <a:avLst/>
-        </a:prstGeom>
-        <a:noFill/>
-        <a:ln>
-          <a:noFill/>
-        </a:ln>
-        <a:effectLst/>
-      </dsp:spPr>
-      <dsp:style>
-        <a:lnRef idx="0">
-          <a:scrgbClr r="0" g="0" b="0"/>
-        </a:lnRef>
-        <a:fillRef idx="0">
-          <a:scrgbClr r="0" g="0" b="0"/>
-        </a:fillRef>
-        <a:effectRef idx="0">
-          <a:scrgbClr r="0" g="0" b="0"/>
-        </a:effectRef>
-        <a:fontRef idx="minor"/>
-      </dsp:style>
-      <dsp:txBody>
-        <a:bodyPr spcFirstLastPara="0" vert="horz" wrap="square" lIns="0" tIns="0" rIns="0" bIns="0" numCol="1" spcCol="1270" anchor="t" anchorCtr="0">
-          <a:noAutofit/>
-        </a:bodyPr>
-        <a:lstStyle/>
-        <a:p>
-          <a:pPr marL="171450" lvl="1" indent="-171450" algn="l" defTabSz="755650">
-            <a:lnSpc>
-              <a:spcPct val="90000"/>
-            </a:lnSpc>
-            <a:spcBef>
-              <a:spcPct val="0"/>
-            </a:spcBef>
-            <a:spcAft>
-              <a:spcPct val="15000"/>
-            </a:spcAft>
-            <a:buChar char="•"/>
-          </a:pPr>
-          <a:r>
-            <a:rPr lang="it-IT" sz="1700" b="1" kern="1200" dirty="0"/>
-            <a:t>Approccio: </a:t>
-          </a:r>
-          <a:r>
-            <a:rPr lang="it-IT" sz="1700" b="0" kern="1200" dirty="0"/>
-            <a:t>suddividere il testo delle recensioni in coppie di parole</a:t>
-          </a:r>
-          <a:endParaRPr lang="en-US" sz="1700" kern="1200" dirty="0"/>
-        </a:p>
-        <a:p>
-          <a:pPr marL="171450" lvl="1" indent="-171450" algn="l" defTabSz="755650">
-            <a:lnSpc>
-              <a:spcPct val="90000"/>
-            </a:lnSpc>
-            <a:spcBef>
-              <a:spcPct val="0"/>
-            </a:spcBef>
-            <a:spcAft>
-              <a:spcPct val="15000"/>
-            </a:spcAft>
-            <a:buChar char="•"/>
-          </a:pPr>
-          <a:r>
-            <a:rPr lang="it-IT" sz="1700" b="1" kern="1200" dirty="0"/>
-            <a:t>Motivazione:</a:t>
-          </a:r>
-          <a:r>
-            <a:rPr lang="it-IT" sz="1700" kern="1200" dirty="0"/>
-            <a:t> Preservare il contesto semantico</a:t>
-          </a:r>
-          <a:endParaRPr lang="en-US" sz="1700" kern="1200" dirty="0"/>
-        </a:p>
-      </dsp:txBody>
-      <dsp:txXfrm>
-        <a:off x="3486674" y="2055158"/>
-        <a:ext cx="2113311" cy="2920500"/>
-      </dsp:txXfrm>
-    </dsp:sp>
-    <dsp:sp modelId="{4F2F3A95-9C38-4EC4-B68F-D999D42C91D2}">
-      <dsp:nvSpPr>
-        <dsp:cNvPr id="0" name=""/>
-        <dsp:cNvSpPr/>
-      </dsp:nvSpPr>
-      <dsp:spPr>
-        <a:xfrm>
-          <a:off x="3486674" y="858178"/>
-          <a:ext cx="2113311" cy="1088163"/>
-        </a:xfrm>
-        <a:prstGeom prst="rect">
-          <a:avLst/>
-        </a:prstGeom>
-        <a:noFill/>
-        <a:ln>
-          <a:noFill/>
-        </a:ln>
-        <a:effectLst/>
-      </dsp:spPr>
-      <dsp:style>
-        <a:lnRef idx="0">
-          <a:scrgbClr r="0" g="0" b="0"/>
-        </a:lnRef>
-        <a:fillRef idx="0">
-          <a:scrgbClr r="0" g="0" b="0"/>
-        </a:fillRef>
-        <a:effectRef idx="0">
-          <a:scrgbClr r="0" g="0" b="0"/>
-        </a:effectRef>
-        <a:fontRef idx="minor"/>
-      </dsp:style>
-      <dsp:txBody>
-        <a:bodyPr spcFirstLastPara="0" vert="horz" wrap="square" lIns="0" tIns="223520" rIns="0" bIns="223520" numCol="1" spcCol="1270" anchor="ctr" anchorCtr="0">
-          <a:noAutofit/>
-        </a:bodyPr>
-        <a:lstStyle/>
-        <a:p>
-          <a:pPr marL="0" lvl="0" indent="0" algn="l" defTabSz="977900">
-            <a:lnSpc>
-              <a:spcPct val="90000"/>
-            </a:lnSpc>
-            <a:spcBef>
-              <a:spcPct val="0"/>
-            </a:spcBef>
-            <a:spcAft>
-              <a:spcPct val="35000"/>
-            </a:spcAft>
-            <a:buNone/>
-          </a:pPr>
-          <a:r>
-            <a:rPr lang="it-IT" sz="2200" b="1" kern="1200" dirty="0"/>
-            <a:t>Estrazione dei bigrammi</a:t>
           </a:r>
           <a:endParaRPr lang="en-US" sz="2200" kern="1200" dirty="0"/>
         </a:p>
@@ -17625,7 +17710,7 @@
             <a:pPr rtl="0"/>
             <a:fld id="{6724D395-066A-4F84-B1F6-A3F921994FFC}" type="datetime1">
               <a:rPr lang="it-IT" smtClean="0"/>
-              <a:t>27/01/2026</a:t>
+              <a:t>28/01/2026</a:t>
             </a:fld>
             <a:endParaRPr lang="it-IT" dirty="0"/>
           </a:p>
@@ -17806,7 +17891,7 @@
             <a:fld id="{8E5CCF99-E88A-4792-B58A-FDEDC94DDECB}" type="datetime1">
               <a:rPr lang="it-IT" smtClean="0"/>
               <a:pPr/>
-              <a:t>27/01/2026</a:t>
+              <a:t>28/01/2026</a:t>
             </a:fld>
             <a:endParaRPr lang="it-IT" dirty="0"/>
           </a:p>
@@ -18277,100 +18362,6 @@
   <p:cSld>
     <p:spTree>
       <p:nvGrpSpPr>
-        <p:cNvPr id="1" name=""/>
-        <p:cNvGrpSpPr/>
-        <p:nvPr/>
-      </p:nvGrpSpPr>
-      <p:grpSpPr>
-        <a:xfrm>
-          <a:off x="0" y="0"/>
-          <a:ext cx="0" cy="0"/>
-          <a:chOff x="0" y="0"/>
-          <a:chExt cx="0" cy="0"/>
-        </a:xfrm>
-      </p:grpSpPr>
-      <p:sp>
-        <p:nvSpPr>
-          <p:cNvPr id="2" name="Segnaposto immagine diapositiva 1"/>
-          <p:cNvSpPr>
-            <a:spLocks noGrp="1" noRot="1" noChangeAspect="1"/>
-          </p:cNvSpPr>
-          <p:nvPr>
-            <p:ph type="sldImg"/>
-          </p:nvPr>
-        </p:nvSpPr>
-        <p:spPr/>
-      </p:sp>
-      <p:sp>
-        <p:nvSpPr>
-          <p:cNvPr id="3" name="Segnaposto note 2"/>
-          <p:cNvSpPr>
-            <a:spLocks noGrp="1"/>
-          </p:cNvSpPr>
-          <p:nvPr>
-            <p:ph type="body" idx="1"/>
-          </p:nvPr>
-        </p:nvSpPr>
-        <p:spPr/>
-        <p:txBody>
-          <a:bodyPr rtlCol="0"/>
-          <a:lstStyle>
-            <a:defPPr>
-              <a:defRPr lang="it-IT"/>
-            </a:defPPr>
-          </a:lstStyle>
-          <a:p>
-            <a:pPr rtl="0"/>
-            <a:endParaRPr lang="it-IT" dirty="0"/>
-          </a:p>
-        </p:txBody>
-      </p:sp>
-      <p:sp>
-        <p:nvSpPr>
-          <p:cNvPr id="4" name="Segnaposto numero diapositiva 3"/>
-          <p:cNvSpPr>
-            <a:spLocks noGrp="1"/>
-          </p:cNvSpPr>
-          <p:nvPr>
-            <p:ph type="sldNum" sz="quarter" idx="5"/>
-          </p:nvPr>
-        </p:nvSpPr>
-        <p:spPr/>
-        <p:txBody>
-          <a:bodyPr rtlCol="0"/>
-          <a:lstStyle>
-            <a:defPPr>
-              <a:defRPr lang="it-IT"/>
-            </a:defPPr>
-          </a:lstStyle>
-          <a:p>
-            <a:pPr rtl="0"/>
-            <a:fld id="{F97DC217-DF71-1A49-B3EA-559F1F43B0FF}" type="slidenum">
-              <a:rPr lang="it-IT" smtClean="0"/>
-              <a:t>4</a:t>
-            </a:fld>
-            <a:endParaRPr lang="it-IT" dirty="0"/>
-          </a:p>
-        </p:txBody>
-      </p:sp>
-    </p:spTree>
-    <p:extLst>
-      <p:ext uri="{BB962C8B-B14F-4D97-AF65-F5344CB8AC3E}">
-        <p14:creationId xmlns:p14="http://schemas.microsoft.com/office/powerpoint/2010/main" val="1938948903"/>
-      </p:ext>
-    </p:extLst>
-  </p:cSld>
-  <p:clrMapOvr>
-    <a:masterClrMapping/>
-  </p:clrMapOvr>
-</p:notes>
-</file>
-
-<file path=ppt/notesSlides/notesSlide4.xml><?xml version="1.0" encoding="utf-8"?>
-<p:notes xmlns:a="http://schemas.openxmlformats.org/drawingml/2006/main" xmlns:r="http://schemas.openxmlformats.org/officeDocument/2006/relationships" xmlns:p="http://schemas.openxmlformats.org/presentationml/2006/main">
-  <p:cSld>
-    <p:spTree>
-      <p:nvGrpSpPr>
         <p:cNvPr id="1" name="">
           <a:extLst>
             <a:ext uri="{FF2B5EF4-FFF2-40B4-BE49-F238E27FC236}">
@@ -18465,7 +18456,7 @@
             <a:pPr rtl="0"/>
             <a:fld id="{F97DC217-DF71-1A49-B3EA-559F1F43B0FF}" type="slidenum">
               <a:rPr lang="it-IT" smtClean="0"/>
-              <a:t>5</a:t>
+              <a:t>4</a:t>
             </a:fld>
             <a:endParaRPr lang="it-IT" dirty="0"/>
           </a:p>
@@ -18484,7 +18475,7 @@
 </p:notes>
 </file>
 
-<file path=ppt/notesSlides/notesSlide5.xml><?xml version="1.0" encoding="utf-8"?>
+<file path=ppt/notesSlides/notesSlide4.xml><?xml version="1.0" encoding="utf-8"?>
 <p:notes xmlns:a="http://schemas.openxmlformats.org/drawingml/2006/main" xmlns:r="http://schemas.openxmlformats.org/officeDocument/2006/relationships" xmlns:p="http://schemas.openxmlformats.org/presentationml/2006/main">
   <p:cSld>
     <p:spTree>
@@ -18559,7 +18550,7 @@
             <a:pPr rtl="0"/>
             <a:fld id="{F97DC217-DF71-1A49-B3EA-559F1F43B0FF}" type="slidenum">
               <a:rPr lang="it-IT" smtClean="0"/>
-              <a:t>6</a:t>
+              <a:t>5</a:t>
             </a:fld>
             <a:endParaRPr lang="it-IT" dirty="0"/>
           </a:p>
@@ -18578,7 +18569,7 @@
 </p:notes>
 </file>
 
-<file path=ppt/notesSlides/notesSlide6.xml><?xml version="1.0" encoding="utf-8"?>
+<file path=ppt/notesSlides/notesSlide5.xml><?xml version="1.0" encoding="utf-8"?>
 <p:notes xmlns:a="http://schemas.openxmlformats.org/drawingml/2006/main" xmlns:r="http://schemas.openxmlformats.org/officeDocument/2006/relationships" xmlns:p="http://schemas.openxmlformats.org/presentationml/2006/main">
   <p:cSld>
     <p:spTree>
@@ -18677,7 +18668,7 @@
             <a:pPr rtl="0"/>
             <a:fld id="{F97DC217-DF71-1A49-B3EA-559F1F43B0FF}" type="slidenum">
               <a:rPr lang="it-IT" smtClean="0"/>
-              <a:t>7</a:t>
+              <a:t>6</a:t>
             </a:fld>
             <a:endParaRPr lang="it-IT" dirty="0"/>
           </a:p>
@@ -18696,7 +18687,7 @@
 </p:notes>
 </file>
 
-<file path=ppt/notesSlides/notesSlide7.xml><?xml version="1.0" encoding="utf-8"?>
+<file path=ppt/notesSlides/notesSlide6.xml><?xml version="1.0" encoding="utf-8"?>
 <p:notes xmlns:a="http://schemas.openxmlformats.org/drawingml/2006/main" xmlns:r="http://schemas.openxmlformats.org/officeDocument/2006/relationships" xmlns:p="http://schemas.openxmlformats.org/presentationml/2006/main">
   <p:cSld>
     <p:spTree>
@@ -18771,7 +18762,7 @@
             <a:pPr rtl="0"/>
             <a:fld id="{F97DC217-DF71-1A49-B3EA-559F1F43B0FF}" type="slidenum">
               <a:rPr lang="it-IT" smtClean="0"/>
-              <a:t>8</a:t>
+              <a:t>7</a:t>
             </a:fld>
             <a:endParaRPr lang="it-IT" dirty="0"/>
           </a:p>
@@ -18790,7 +18781,7 @@
 </p:notes>
 </file>
 
-<file path=ppt/notesSlides/notesSlide8.xml><?xml version="1.0" encoding="utf-8"?>
+<file path=ppt/notesSlides/notesSlide7.xml><?xml version="1.0" encoding="utf-8"?>
 <p:notes xmlns:a="http://schemas.openxmlformats.org/drawingml/2006/main" xmlns:r="http://schemas.openxmlformats.org/officeDocument/2006/relationships" xmlns:p="http://schemas.openxmlformats.org/presentationml/2006/main">
   <p:cSld>
     <p:spTree>
@@ -18856,7 +18847,7 @@
             <a:pPr rtl="0"/>
             <a:fld id="{F97DC217-DF71-1A49-B3EA-559F1F43B0FF}" type="slidenum">
               <a:rPr lang="it-IT" smtClean="0"/>
-              <a:t>9</a:t>
+              <a:t>8</a:t>
             </a:fld>
             <a:endParaRPr lang="it-IT" dirty="0"/>
           </a:p>
@@ -18875,7 +18866,7 @@
 </p:notes>
 </file>
 
-<file path=ppt/notesSlides/notesSlide9.xml><?xml version="1.0" encoding="utf-8"?>
+<file path=ppt/notesSlides/notesSlide8.xml><?xml version="1.0" encoding="utf-8"?>
 <p:notes xmlns:a="http://schemas.openxmlformats.org/drawingml/2006/main" xmlns:r="http://schemas.openxmlformats.org/officeDocument/2006/relationships" xmlns:p="http://schemas.openxmlformats.org/presentationml/2006/main">
   <p:cSld>
     <p:spTree>
@@ -18950,7 +18941,7 @@
             <a:pPr rtl="0"/>
             <a:fld id="{F97DC217-DF71-1A49-B3EA-559F1F43B0FF}" type="slidenum">
               <a:rPr lang="it-IT" smtClean="0"/>
-              <a:t>11</a:t>
+              <a:t>10</a:t>
             </a:fld>
             <a:endParaRPr lang="it-IT" dirty="0"/>
           </a:p>
@@ -27233,187 +27224,6 @@
       </p:grpSpPr>
       <p:sp>
         <p:nvSpPr>
-          <p:cNvPr id="2" name="Titolo 1">
-            <a:extLst>
-              <a:ext uri="{FF2B5EF4-FFF2-40B4-BE49-F238E27FC236}">
-                <a16:creationId xmlns:a16="http://schemas.microsoft.com/office/drawing/2014/main" id="{E6AF7C7E-61E4-AEC4-743A-CDA10420B896}"/>
-              </a:ext>
-            </a:extLst>
-          </p:cNvPr>
-          <p:cNvSpPr>
-            <a:spLocks noGrp="1"/>
-          </p:cNvSpPr>
-          <p:nvPr>
-            <p:ph type="title"/>
-          </p:nvPr>
-        </p:nvSpPr>
-        <p:spPr>
-          <a:xfrm>
-            <a:off x="749528" y="278765"/>
-            <a:ext cx="9779183" cy="1600835"/>
-          </a:xfrm>
-        </p:spPr>
-        <p:txBody>
-          <a:bodyPr vert="horz" lIns="91440" tIns="45720" rIns="91440" bIns="45720" rtlCol="0" anchor="b">
-            <a:normAutofit/>
-          </a:bodyPr>
-          <a:lstStyle/>
-          <a:p>
-            <a:r>
-              <a:rPr lang="it-IT" b="1" kern="1200" dirty="0">
-                <a:latin typeface="+mj-lt"/>
-                <a:ea typeface="+mj-ea"/>
-                <a:cs typeface="+mj-cs"/>
-              </a:rPr>
-              <a:t>Conclusioni</a:t>
-            </a:r>
-          </a:p>
-        </p:txBody>
-      </p:sp>
-      <p:sp>
-        <p:nvSpPr>
-          <p:cNvPr id="5" name="CasellaDiTesto 4">
-            <a:extLst>
-              <a:ext uri="{FF2B5EF4-FFF2-40B4-BE49-F238E27FC236}">
-                <a16:creationId xmlns:a16="http://schemas.microsoft.com/office/drawing/2014/main" id="{2B3FB53C-929F-A3B8-AD82-9124A834F0E1}"/>
-              </a:ext>
-            </a:extLst>
-          </p:cNvPr>
-          <p:cNvSpPr txBox="1"/>
-          <p:nvPr/>
-        </p:nvSpPr>
-        <p:spPr>
-          <a:xfrm>
-            <a:off x="749528" y="2693353"/>
-            <a:ext cx="10197147" cy="3436936"/>
-          </a:xfrm>
-          <a:prstGeom prst="rect">
-            <a:avLst/>
-          </a:prstGeom>
-        </p:spPr>
-        <p:txBody>
-          <a:bodyPr vert="horz" lIns="91440" tIns="45720" rIns="91440" bIns="45720" rtlCol="0">
-            <a:normAutofit/>
-          </a:bodyPr>
-          <a:lstStyle/>
-          <a:p>
-            <a:pPr marL="342900" indent="-283464" algn="just">
-              <a:lnSpc>
-                <a:spcPct val="90000"/>
-              </a:lnSpc>
-              <a:spcBef>
-                <a:spcPts val="1000"/>
-              </a:spcBef>
-              <a:buFont typeface="Arial" panose="020B0604020202020204" pitchFamily="34" charset="0"/>
-              <a:buChar char="•"/>
-            </a:pPr>
-            <a:r>
-              <a:rPr lang="it-IT" sz="2000" b="1" dirty="0">
-                <a:solidFill>
-                  <a:schemeClr val="bg1"/>
-                </a:solidFill>
-              </a:rPr>
-              <a:t>Solidità Infrastrutturale:</a:t>
-            </a:r>
-            <a:r>
-              <a:rPr lang="it-IT" sz="2000" dirty="0">
-                <a:solidFill>
-                  <a:schemeClr val="bg1"/>
-                </a:solidFill>
-              </a:rPr>
-              <a:t> I benchmark confermano l'efficacia del cluster distribuito in quanto è stato ottenuta una scalabilità quasi lineare, dimostrando che il sistema converte efficientemente le risorse aggiuntive in velocità. L'integrazione con HDFS ha inoltre garantito la sopravvivenza del job anche in caso di guasti critici.</a:t>
-            </a:r>
-          </a:p>
-          <a:p>
-            <a:pPr marL="342900" indent="-283464" algn="just">
-              <a:lnSpc>
-                <a:spcPct val="90000"/>
-              </a:lnSpc>
-              <a:spcBef>
-                <a:spcPts val="1000"/>
-              </a:spcBef>
-              <a:buFont typeface="Arial" panose="020B0604020202020204" pitchFamily="34" charset="0"/>
-              <a:buChar char="•"/>
-            </a:pPr>
-            <a:r>
-              <a:rPr lang="it-IT" sz="2000" b="1" dirty="0">
-                <a:solidFill>
-                  <a:schemeClr val="bg1"/>
-                </a:solidFill>
-              </a:rPr>
-              <a:t>Valore Analitico: </a:t>
-            </a:r>
-            <a:r>
-              <a:rPr lang="it-IT" sz="2000" dirty="0">
-                <a:solidFill>
-                  <a:schemeClr val="bg1"/>
-                </a:solidFill>
-              </a:rPr>
-              <a:t>è stata superata la superficialità delle metriche quantitative e, mediante l'analisi semantica granulare, è stato possibile diagnosticare le cause radice specifiche per ogni applicazione e generali di insoddisfazione, trasformando milioni di dati grezzi in indicazioni strategiche reali.</a:t>
-            </a:r>
-          </a:p>
-          <a:p>
-            <a:pPr marL="342900" indent="-283464" algn="just">
-              <a:lnSpc>
-                <a:spcPct val="90000"/>
-              </a:lnSpc>
-              <a:spcBef>
-                <a:spcPts val="1000"/>
-              </a:spcBef>
-              <a:buFont typeface="Arial" panose="020B0604020202020204" pitchFamily="34" charset="0"/>
-              <a:buChar char="•"/>
-            </a:pPr>
-            <a:r>
-              <a:rPr lang="it-IT" sz="2000" b="1" dirty="0">
-                <a:solidFill>
-                  <a:schemeClr val="bg1"/>
-                </a:solidFill>
-              </a:rPr>
-              <a:t>Verdetto Tecnologico</a:t>
-            </a:r>
-            <a:r>
-              <a:rPr lang="it-IT" sz="2000" dirty="0">
-                <a:solidFill>
-                  <a:schemeClr val="bg1"/>
-                </a:solidFill>
-              </a:rPr>
-              <a:t> L'accoppiata utilizzato si conferma una soluzione industriale matura, capace di abbattere drasticamente la latenza decisionale su grandi volumi di dati non strutturati.</a:t>
-            </a:r>
-          </a:p>
-        </p:txBody>
-      </p:sp>
-    </p:spTree>
-    <p:extLst>
-      <p:ext uri="{BB962C8B-B14F-4D97-AF65-F5344CB8AC3E}">
-        <p14:creationId xmlns:p14="http://schemas.microsoft.com/office/powerpoint/2010/main" val="22191112"/>
-      </p:ext>
-    </p:extLst>
-  </p:cSld>
-  <p:clrMapOvr>
-    <a:masterClrMapping/>
-  </p:clrMapOvr>
-</p:sld>
-</file>
-
-<file path=ppt/slides/slide11.xml><?xml version="1.0" encoding="utf-8"?>
-<p:sld xmlns:a="http://schemas.openxmlformats.org/drawingml/2006/main" xmlns:r="http://schemas.openxmlformats.org/officeDocument/2006/relationships" xmlns:p="http://schemas.openxmlformats.org/presentationml/2006/main">
-  <p:cSld>
-    <p:spTree>
-      <p:nvGrpSpPr>
-        <p:cNvPr id="1" name=""/>
-        <p:cNvGrpSpPr/>
-        <p:nvPr/>
-      </p:nvGrpSpPr>
-      <p:grpSpPr>
-        <a:xfrm>
-          <a:off x="0" y="0"/>
-          <a:ext cx="0" cy="0"/>
-          <a:chOff x="0" y="0"/>
-          <a:chExt cx="0" cy="0"/>
-        </a:xfrm>
-      </p:grpSpPr>
-      <p:sp>
-        <p:nvSpPr>
           <p:cNvPr id="7" name="Titolo 6">
             <a:extLst>
               <a:ext uri="{FF2B5EF4-FFF2-40B4-BE49-F238E27FC236}">
@@ -27592,7 +27402,7 @@
             <p:ph idx="14"/>
             <p:extLst>
               <p:ext uri="{D42A27DB-BD31-4B8C-83A1-F6EECF244321}">
-                <p14:modId xmlns:p14="http://schemas.microsoft.com/office/powerpoint/2010/main" val="4166394451"/>
+                <p14:modId xmlns:p14="http://schemas.microsoft.com/office/powerpoint/2010/main" val="182490077"/>
               </p:ext>
             </p:extLst>
           </p:nvPr>
@@ -27697,7 +27507,7 @@
             <p:ph idx="1"/>
             <p:extLst>
               <p:ext uri="{D42A27DB-BD31-4B8C-83A1-F6EECF244321}">
-                <p14:modId xmlns:p14="http://schemas.microsoft.com/office/powerpoint/2010/main" val="1755747156"/>
+                <p14:modId xmlns:p14="http://schemas.microsoft.com/office/powerpoint/2010/main" val="3234482129"/>
               </p:ext>
             </p:extLst>
           </p:nvPr>
@@ -27726,500 +27536,6 @@
 </file>
 
 <file path=ppt/slides/slide4.xml><?xml version="1.0" encoding="utf-8"?>
-<p:sld xmlns:a="http://schemas.openxmlformats.org/drawingml/2006/main" xmlns:r="http://schemas.openxmlformats.org/officeDocument/2006/relationships" xmlns:p="http://schemas.openxmlformats.org/presentationml/2006/main">
-  <p:cSld>
-    <p:spTree>
-      <p:nvGrpSpPr>
-        <p:cNvPr id="1" name=""/>
-        <p:cNvGrpSpPr/>
-        <p:nvPr/>
-      </p:nvGrpSpPr>
-      <p:grpSpPr>
-        <a:xfrm>
-          <a:off x="0" y="0"/>
-          <a:ext cx="0" cy="0"/>
-          <a:chOff x="0" y="0"/>
-          <a:chExt cx="0" cy="0"/>
-        </a:xfrm>
-      </p:grpSpPr>
-      <p:sp>
-        <p:nvSpPr>
-          <p:cNvPr id="2" name="Titolo 1">
-            <a:extLst>
-              <a:ext uri="{FF2B5EF4-FFF2-40B4-BE49-F238E27FC236}">
-                <a16:creationId xmlns:a16="http://schemas.microsoft.com/office/drawing/2014/main" id="{6F148DD4-4828-CE87-0C5C-42BE175E8DA5}"/>
-              </a:ext>
-            </a:extLst>
-          </p:cNvPr>
-          <p:cNvSpPr>
-            <a:spLocks noGrp="1"/>
-          </p:cNvSpPr>
-          <p:nvPr>
-            <p:ph type="title"/>
-          </p:nvPr>
-        </p:nvSpPr>
-        <p:spPr>
-          <a:xfrm>
-            <a:off x="1927123" y="264693"/>
-            <a:ext cx="11444748" cy="1275347"/>
-          </a:xfrm>
-        </p:spPr>
-        <p:txBody>
-          <a:bodyPr rtlCol="0"/>
-          <a:lstStyle>
-            <a:defPPr>
-              <a:defRPr lang="it-IT"/>
-            </a:defPPr>
-          </a:lstStyle>
-          <a:p>
-            <a:r>
-              <a:rPr lang="it-IT" sz="4400" dirty="0"/>
-              <a:t>Data Engineering e Preparazione </a:t>
-            </a:r>
-          </a:p>
-        </p:txBody>
-      </p:sp>
-      <p:sp>
-        <p:nvSpPr>
-          <p:cNvPr id="4" name="Segnaposto contenuto 3">
-            <a:extLst>
-              <a:ext uri="{FF2B5EF4-FFF2-40B4-BE49-F238E27FC236}">
-                <a16:creationId xmlns:a16="http://schemas.microsoft.com/office/drawing/2014/main" id="{51F217A4-4293-23BF-432F-A1E752B25CD6}"/>
-              </a:ext>
-            </a:extLst>
-          </p:cNvPr>
-          <p:cNvSpPr txBox="1">
-            <a:spLocks/>
-          </p:cNvSpPr>
-          <p:nvPr/>
-        </p:nvSpPr>
-        <p:spPr>
-          <a:xfrm>
-            <a:off x="1171075" y="1540040"/>
-            <a:ext cx="10193677" cy="4100714"/>
-          </a:xfrm>
-          <a:prstGeom prst="rect">
-            <a:avLst/>
-          </a:prstGeom>
-        </p:spPr>
-        <p:txBody>
-          <a:bodyPr rtlCol="0">
-            <a:normAutofit/>
-          </a:bodyPr>
-          <a:lstStyle>
-            <a:defPPr>
-              <a:defRPr lang="it-IT"/>
-            </a:defPPr>
-            <a:lvl1pPr marL="228600" indent="-228600" algn="l" defTabSz="914400" rtl="0" eaLnBrk="1" latinLnBrk="0" hangingPunct="1">
-              <a:lnSpc>
-                <a:spcPct val="90000"/>
-              </a:lnSpc>
-              <a:spcBef>
-                <a:spcPts val="1000"/>
-              </a:spcBef>
-              <a:buFont typeface="Arial" panose="020B0604020202020204" pitchFamily="34" charset="0"/>
-              <a:buChar char="•"/>
-              <a:defRPr lang="it-IT" sz="2800" kern="1200">
-                <a:solidFill>
-                  <a:schemeClr val="tx1"/>
-                </a:solidFill>
-                <a:latin typeface="+mn-lt"/>
-                <a:ea typeface="+mn-ea"/>
-                <a:cs typeface="+mn-cs"/>
-              </a:defRPr>
-            </a:lvl1pPr>
-            <a:lvl2pPr marL="685800" indent="-228600" algn="l" defTabSz="914400" rtl="0" eaLnBrk="1" latinLnBrk="0" hangingPunct="1">
-              <a:lnSpc>
-                <a:spcPct val="90000"/>
-              </a:lnSpc>
-              <a:spcBef>
-                <a:spcPts val="500"/>
-              </a:spcBef>
-              <a:buFont typeface="Arial" panose="020B0604020202020204" pitchFamily="34" charset="0"/>
-              <a:buChar char="•"/>
-              <a:defRPr lang="it-IT" sz="2400" kern="1200">
-                <a:solidFill>
-                  <a:schemeClr val="tx1"/>
-                </a:solidFill>
-                <a:latin typeface="+mn-lt"/>
-                <a:ea typeface="+mn-ea"/>
-                <a:cs typeface="+mn-cs"/>
-              </a:defRPr>
-            </a:lvl2pPr>
-            <a:lvl3pPr marL="1143000" indent="-228600" algn="l" defTabSz="914400" rtl="0" eaLnBrk="1" latinLnBrk="0" hangingPunct="1">
-              <a:lnSpc>
-                <a:spcPct val="90000"/>
-              </a:lnSpc>
-              <a:spcBef>
-                <a:spcPts val="500"/>
-              </a:spcBef>
-              <a:buFont typeface="Arial" panose="020B0604020202020204" pitchFamily="34" charset="0"/>
-              <a:buChar char="•"/>
-              <a:defRPr lang="it-IT" sz="2000" kern="1200">
-                <a:solidFill>
-                  <a:schemeClr val="tx1"/>
-                </a:solidFill>
-                <a:latin typeface="+mn-lt"/>
-                <a:ea typeface="+mn-ea"/>
-                <a:cs typeface="+mn-cs"/>
-              </a:defRPr>
-            </a:lvl3pPr>
-            <a:lvl4pPr marL="1600200" indent="-228600" algn="l" defTabSz="914400" rtl="0" eaLnBrk="1" latinLnBrk="0" hangingPunct="1">
-              <a:lnSpc>
-                <a:spcPct val="90000"/>
-              </a:lnSpc>
-              <a:spcBef>
-                <a:spcPts val="500"/>
-              </a:spcBef>
-              <a:buFont typeface="Arial" panose="020B0604020202020204" pitchFamily="34" charset="0"/>
-              <a:buChar char="•"/>
-              <a:defRPr lang="it-IT" sz="1800" kern="1200">
-                <a:solidFill>
-                  <a:schemeClr val="tx1"/>
-                </a:solidFill>
-                <a:latin typeface="+mn-lt"/>
-                <a:ea typeface="+mn-ea"/>
-                <a:cs typeface="+mn-cs"/>
-              </a:defRPr>
-            </a:lvl4pPr>
-            <a:lvl5pPr marL="2057400" indent="-228600" algn="l" defTabSz="914400" rtl="0" eaLnBrk="1" latinLnBrk="0" hangingPunct="1">
-              <a:lnSpc>
-                <a:spcPct val="90000"/>
-              </a:lnSpc>
-              <a:spcBef>
-                <a:spcPts val="500"/>
-              </a:spcBef>
-              <a:buFont typeface="Arial" panose="020B0604020202020204" pitchFamily="34" charset="0"/>
-              <a:buChar char="•"/>
-              <a:defRPr lang="it-IT" sz="1800" kern="1200">
-                <a:solidFill>
-                  <a:schemeClr val="tx1"/>
-                </a:solidFill>
-                <a:latin typeface="+mn-lt"/>
-                <a:ea typeface="+mn-ea"/>
-                <a:cs typeface="+mn-cs"/>
-              </a:defRPr>
-            </a:lvl5pPr>
-            <a:lvl6pPr marL="2514600" indent="-228600" algn="l" defTabSz="914400" rtl="0" eaLnBrk="1" latinLnBrk="0" hangingPunct="1">
-              <a:lnSpc>
-                <a:spcPct val="90000"/>
-              </a:lnSpc>
-              <a:spcBef>
-                <a:spcPts val="500"/>
-              </a:spcBef>
-              <a:buFont typeface="Arial" panose="020B0604020202020204" pitchFamily="34" charset="0"/>
-              <a:buChar char="•"/>
-              <a:defRPr lang="it-IT" sz="1800" kern="1200">
-                <a:solidFill>
-                  <a:schemeClr val="tx1"/>
-                </a:solidFill>
-                <a:latin typeface="+mn-lt"/>
-                <a:ea typeface="+mn-ea"/>
-                <a:cs typeface="+mn-cs"/>
-              </a:defRPr>
-            </a:lvl6pPr>
-            <a:lvl7pPr marL="2971800" indent="-228600" algn="l" defTabSz="914400" rtl="0" eaLnBrk="1" latinLnBrk="0" hangingPunct="1">
-              <a:lnSpc>
-                <a:spcPct val="90000"/>
-              </a:lnSpc>
-              <a:spcBef>
-                <a:spcPts val="500"/>
-              </a:spcBef>
-              <a:buFont typeface="Arial" panose="020B0604020202020204" pitchFamily="34" charset="0"/>
-              <a:buChar char="•"/>
-              <a:defRPr lang="it-IT" sz="1800" kern="1200">
-                <a:solidFill>
-                  <a:schemeClr val="tx1"/>
-                </a:solidFill>
-                <a:latin typeface="+mn-lt"/>
-                <a:ea typeface="+mn-ea"/>
-                <a:cs typeface="+mn-cs"/>
-              </a:defRPr>
-            </a:lvl7pPr>
-            <a:lvl8pPr marL="3429000" indent="-228600" algn="l" defTabSz="914400" rtl="0" eaLnBrk="1" latinLnBrk="0" hangingPunct="1">
-              <a:lnSpc>
-                <a:spcPct val="90000"/>
-              </a:lnSpc>
-              <a:spcBef>
-                <a:spcPts val="500"/>
-              </a:spcBef>
-              <a:buFont typeface="Arial" panose="020B0604020202020204" pitchFamily="34" charset="0"/>
-              <a:buChar char="•"/>
-              <a:defRPr lang="it-IT" sz="1800" kern="1200">
-                <a:solidFill>
-                  <a:schemeClr val="tx1"/>
-                </a:solidFill>
-                <a:latin typeface="+mn-lt"/>
-                <a:ea typeface="+mn-ea"/>
-                <a:cs typeface="+mn-cs"/>
-              </a:defRPr>
-            </a:lvl8pPr>
-            <a:lvl9pPr marL="3886200" indent="-228600" algn="l" defTabSz="914400" rtl="0" eaLnBrk="1" latinLnBrk="0" hangingPunct="1">
-              <a:lnSpc>
-                <a:spcPct val="90000"/>
-              </a:lnSpc>
-              <a:spcBef>
-                <a:spcPts val="500"/>
-              </a:spcBef>
-              <a:buFont typeface="Arial" panose="020B0604020202020204" pitchFamily="34" charset="0"/>
-              <a:buChar char="•"/>
-              <a:defRPr lang="it-IT" sz="1800" kern="1200">
-                <a:solidFill>
-                  <a:schemeClr val="tx1"/>
-                </a:solidFill>
-                <a:latin typeface="+mn-lt"/>
-                <a:ea typeface="+mn-ea"/>
-                <a:cs typeface="+mn-cs"/>
-              </a:defRPr>
-            </a:lvl9pPr>
-          </a:lstStyle>
-          <a:p>
-            <a:pPr marL="0" indent="0">
-              <a:buNone/>
-            </a:pPr>
-            <a:endParaRPr lang="it-IT" dirty="0"/>
-          </a:p>
-        </p:txBody>
-      </p:sp>
-      <p:sp>
-        <p:nvSpPr>
-          <p:cNvPr id="5" name="CasellaDiTesto 4">
-            <a:extLst>
-              <a:ext uri="{FF2B5EF4-FFF2-40B4-BE49-F238E27FC236}">
-                <a16:creationId xmlns:a16="http://schemas.microsoft.com/office/drawing/2014/main" id="{C84DD9BD-7BEF-5731-1D49-9846379115A9}"/>
-              </a:ext>
-            </a:extLst>
-          </p:cNvPr>
-          <p:cNvSpPr txBox="1"/>
-          <p:nvPr/>
-        </p:nvSpPr>
-        <p:spPr>
-          <a:xfrm>
-            <a:off x="1927123" y="1540040"/>
-            <a:ext cx="8986683" cy="3693319"/>
-          </a:xfrm>
-          <a:prstGeom prst="rect">
-            <a:avLst/>
-          </a:prstGeom>
-          <a:noFill/>
-        </p:spPr>
-        <p:txBody>
-          <a:bodyPr wrap="square">
-            <a:spAutoFit/>
-          </a:bodyPr>
-          <a:lstStyle/>
-          <a:p>
-            <a:r>
-              <a:rPr lang="it-IT" b="1" dirty="0"/>
-              <a:t>Ingestione Dati</a:t>
-            </a:r>
-            <a:endParaRPr lang="it-IT" dirty="0"/>
-          </a:p>
-          <a:p>
-            <a:pPr marL="285750" indent="-285750">
-              <a:buFont typeface="Arial" panose="020B0604020202020204" pitchFamily="34" charset="0"/>
-              <a:buChar char="•"/>
-            </a:pPr>
-            <a:r>
-              <a:rPr lang="it-IT" b="1" dirty="0"/>
-              <a:t>Input:</a:t>
-            </a:r>
-            <a:r>
-              <a:rPr lang="it-IT" dirty="0"/>
-              <a:t> 20 File CSV eterogenei</a:t>
-            </a:r>
-          </a:p>
-          <a:p>
-            <a:pPr marL="285750" indent="-285750">
-              <a:buFont typeface="Arial" panose="020B0604020202020204" pitchFamily="34" charset="0"/>
-              <a:buChar char="•"/>
-            </a:pPr>
-            <a:r>
-              <a:rPr lang="it-IT" b="1" dirty="0"/>
-              <a:t>Action:</a:t>
-            </a:r>
-            <a:r>
-              <a:rPr lang="it-IT" dirty="0"/>
-              <a:t> Unificazione schema e normalizzazione</a:t>
-            </a:r>
-          </a:p>
-          <a:p>
-            <a:pPr marL="285750" indent="-285750">
-              <a:buFont typeface="Arial" panose="020B0604020202020204" pitchFamily="34" charset="0"/>
-              <a:buChar char="•"/>
-            </a:pPr>
-            <a:r>
-              <a:rPr lang="it-IT" b="1" dirty="0"/>
-              <a:t>Arricchimento:</a:t>
-            </a:r>
-            <a:r>
-              <a:rPr lang="it-IT" dirty="0"/>
-              <a:t> Tagging della sorgente </a:t>
-            </a:r>
-            <a:r>
-              <a:rPr lang="it-IT" dirty="0" err="1">
-                <a:latin typeface="Courier New" panose="02070309020205020404" pitchFamily="49" charset="0"/>
-              </a:rPr>
-              <a:t>app_name</a:t>
-            </a:r>
-            <a:r>
-              <a:rPr lang="it-IT" dirty="0"/>
-              <a:t> per tracciabilità</a:t>
-            </a:r>
-          </a:p>
-          <a:p>
-            <a:endParaRPr lang="it-IT" dirty="0"/>
-          </a:p>
-          <a:p>
-            <a:r>
-              <a:rPr lang="it-IT" b="1" dirty="0"/>
-              <a:t>Data </a:t>
-            </a:r>
-            <a:r>
-              <a:rPr lang="it-IT" b="1" dirty="0" err="1"/>
-              <a:t>Augmentation</a:t>
-            </a:r>
-            <a:endParaRPr lang="it-IT" dirty="0"/>
-          </a:p>
-          <a:p>
-            <a:pPr marL="285750" indent="-285750">
-              <a:buFont typeface="Arial" panose="020B0604020202020204" pitchFamily="34" charset="0"/>
-              <a:buChar char="•"/>
-            </a:pPr>
-            <a:r>
-              <a:rPr lang="it-IT" b="1" dirty="0"/>
-              <a:t>Obiettivo:</a:t>
-            </a:r>
-            <a:r>
-              <a:rPr lang="it-IT" dirty="0"/>
-              <a:t> aumentare il volume dei dati per effettuare stress test</a:t>
-            </a:r>
-          </a:p>
-          <a:p>
-            <a:pPr marL="285750" indent="-285750">
-              <a:buFont typeface="Arial" panose="020B0604020202020204" pitchFamily="34" charset="0"/>
-              <a:buChar char="•"/>
-            </a:pPr>
-            <a:r>
-              <a:rPr lang="it-IT" b="1" dirty="0"/>
-              <a:t>Tecnica:</a:t>
-            </a:r>
-            <a:r>
-              <a:rPr lang="it-IT" dirty="0"/>
-              <a:t> Funzioni Spark </a:t>
-            </a:r>
-            <a:r>
-              <a:rPr lang="it-IT" dirty="0" err="1">
-                <a:latin typeface="Courier New" panose="02070309020205020404" pitchFamily="49" charset="0"/>
-              </a:rPr>
-              <a:t>explode</a:t>
-            </a:r>
-            <a:r>
-              <a:rPr lang="it-IT" dirty="0"/>
-              <a:t> e </a:t>
-            </a:r>
-            <a:r>
-              <a:rPr lang="it-IT" dirty="0" err="1">
-                <a:latin typeface="Courier New" panose="02070309020205020404" pitchFamily="49" charset="0"/>
-              </a:rPr>
-              <a:t>array_repeat</a:t>
-            </a:r>
-            <a:r>
-              <a:rPr lang="it-IT" dirty="0"/>
-              <a:t>.</a:t>
-            </a:r>
-          </a:p>
-          <a:p>
-            <a:pPr marL="285750" indent="-285750">
-              <a:buFont typeface="Arial" panose="020B0604020202020204" pitchFamily="34" charset="0"/>
-              <a:buChar char="•"/>
-            </a:pPr>
-            <a:r>
-              <a:rPr lang="it-IT" b="1" dirty="0"/>
-              <a:t>Integrità:</a:t>
-            </a:r>
-            <a:r>
-              <a:rPr lang="it-IT" dirty="0"/>
-              <a:t> Generazione distribuita di chiave primaria </a:t>
-            </a:r>
-            <a:r>
-              <a:rPr lang="it-IT" dirty="0" err="1">
-                <a:latin typeface="Courier New" panose="02070309020205020404" pitchFamily="49" charset="0"/>
-              </a:rPr>
-              <a:t>unique_id</a:t>
-            </a:r>
-            <a:r>
-              <a:rPr lang="it-IT" dirty="0"/>
-              <a:t>.</a:t>
-            </a:r>
-          </a:p>
-          <a:p>
-            <a:endParaRPr lang="it-IT" dirty="0"/>
-          </a:p>
-          <a:p>
-            <a:r>
-              <a:rPr lang="it-IT" b="1" dirty="0"/>
-              <a:t>Ottimizzazione Storage</a:t>
-            </a:r>
-            <a:endParaRPr lang="it-IT" dirty="0"/>
-          </a:p>
-          <a:p>
-            <a:pPr marL="285750" indent="-285750">
-              <a:buFont typeface="Arial" panose="020B0604020202020204" pitchFamily="34" charset="0"/>
-              <a:buChar char="•"/>
-            </a:pPr>
-            <a:r>
-              <a:rPr lang="it-IT" b="1" dirty="0"/>
-              <a:t>Output:</a:t>
-            </a:r>
-            <a:r>
-              <a:rPr lang="it-IT" dirty="0"/>
-              <a:t> Scrittura su HDFS in formato parquet.</a:t>
-            </a:r>
-          </a:p>
-          <a:p>
-            <a:pPr marL="285750" indent="-285750">
-              <a:buFont typeface="Arial" panose="020B0604020202020204" pitchFamily="34" charset="0"/>
-              <a:buChar char="•"/>
-            </a:pPr>
-            <a:r>
-              <a:rPr lang="it-IT" b="1" dirty="0"/>
-              <a:t>Vantaggio:</a:t>
-            </a:r>
-            <a:r>
-              <a:rPr lang="it-IT" dirty="0"/>
-              <a:t> Abilitazione </a:t>
-            </a:r>
-            <a:r>
-              <a:rPr lang="it-IT" dirty="0" err="1"/>
-              <a:t>Projection</a:t>
-            </a:r>
-            <a:r>
-              <a:rPr lang="it-IT" dirty="0"/>
-              <a:t> </a:t>
-            </a:r>
-            <a:r>
-              <a:rPr lang="it-IT" dirty="0" err="1"/>
-              <a:t>Pushdown</a:t>
-            </a:r>
-            <a:endParaRPr lang="it-IT" dirty="0"/>
-          </a:p>
-        </p:txBody>
-      </p:sp>
-    </p:spTree>
-    <p:extLst>
-      <p:ext uri="{BB962C8B-B14F-4D97-AF65-F5344CB8AC3E}">
-        <p14:creationId xmlns:p14="http://schemas.microsoft.com/office/powerpoint/2010/main" val="3662677160"/>
-      </p:ext>
-    </p:extLst>
-  </p:cSld>
-  <p:clrMapOvr>
-    <a:masterClrMapping/>
-  </p:clrMapOvr>
-</p:sld>
-</file>
-
-<file path=ppt/slides/slide5.xml><?xml version="1.0" encoding="utf-8"?>
 <p:sld xmlns:a="http://schemas.openxmlformats.org/drawingml/2006/main" xmlns:r="http://schemas.openxmlformats.org/officeDocument/2006/relationships" xmlns:p="http://schemas.openxmlformats.org/presentationml/2006/main">
   <p:cSld>
     <p:spTree>
@@ -28496,7 +27812,7 @@
           <p:nvPr>
             <p:extLst>
               <p:ext uri="{D42A27DB-BD31-4B8C-83A1-F6EECF244321}">
-                <p14:modId xmlns:p14="http://schemas.microsoft.com/office/powerpoint/2010/main" val="313641235"/>
+                <p14:modId xmlns:p14="http://schemas.microsoft.com/office/powerpoint/2010/main" val="1199260588"/>
               </p:ext>
             </p:extLst>
           </p:nvPr>
@@ -28524,7 +27840,7 @@
 </p:sld>
 </file>
 
-<file path=ppt/slides/slide6.xml><?xml version="1.0" encoding="utf-8"?>
+<file path=ppt/slides/slide5.xml><?xml version="1.0" encoding="utf-8"?>
 <p:sld xmlns:a="http://schemas.openxmlformats.org/drawingml/2006/main" xmlns:r="http://schemas.openxmlformats.org/officeDocument/2006/relationships" xmlns:p="http://schemas.openxmlformats.org/presentationml/2006/main">
   <p:cSld>
     <p:spTree>
@@ -28597,7 +27913,7 @@
           <p:nvPr>
             <p:extLst>
               <p:ext uri="{D42A27DB-BD31-4B8C-83A1-F6EECF244321}">
-                <p14:modId xmlns:p14="http://schemas.microsoft.com/office/powerpoint/2010/main" val="224193757"/>
+                <p14:modId xmlns:p14="http://schemas.microsoft.com/office/powerpoint/2010/main" val="3151701624"/>
               </p:ext>
             </p:extLst>
           </p:nvPr>
@@ -28625,7 +27941,7 @@
 </p:sld>
 </file>
 
-<file path=ppt/slides/slide7.xml><?xml version="1.0" encoding="utf-8"?>
+<file path=ppt/slides/slide6.xml><?xml version="1.0" encoding="utf-8"?>
 <p:sld xmlns:a="http://schemas.openxmlformats.org/drawingml/2006/main" xmlns:r="http://schemas.openxmlformats.org/officeDocument/2006/relationships" xmlns:p="http://schemas.openxmlformats.org/presentationml/2006/main">
   <p:cSld>
     <p:spTree>
@@ -29885,7 +29201,7 @@
 </p:sld>
 </file>
 
-<file path=ppt/slides/slide8.xml><?xml version="1.0" encoding="utf-8"?>
+<file path=ppt/slides/slide7.xml><?xml version="1.0" encoding="utf-8"?>
 <p:sld xmlns:a="http://schemas.openxmlformats.org/drawingml/2006/main" xmlns:r="http://schemas.openxmlformats.org/officeDocument/2006/relationships" xmlns:p="http://schemas.openxmlformats.org/presentationml/2006/main">
   <p:cSld>
     <p:spTree>
@@ -29986,7 +29302,7 @@
 </p:sld>
 </file>
 
-<file path=ppt/slides/slide9.xml><?xml version="1.0" encoding="utf-8"?>
+<file path=ppt/slides/slide8.xml><?xml version="1.0" encoding="utf-8"?>
 <p:sld xmlns:a="http://schemas.openxmlformats.org/drawingml/2006/main" xmlns:r="http://schemas.openxmlformats.org/officeDocument/2006/relationships" xmlns:p="http://schemas.openxmlformats.org/presentationml/2006/main">
   <p:cSld>
     <p:spTree>
@@ -30141,6 +29457,203 @@
     <p:extLst>
       <p:ext uri="{BB962C8B-B14F-4D97-AF65-F5344CB8AC3E}">
         <p14:creationId xmlns:p14="http://schemas.microsoft.com/office/powerpoint/2010/main" val="1059231409"/>
+      </p:ext>
+    </p:extLst>
+  </p:cSld>
+  <p:clrMapOvr>
+    <a:masterClrMapping/>
+  </p:clrMapOvr>
+</p:sld>
+</file>
+
+<file path=ppt/slides/slide9.xml><?xml version="1.0" encoding="utf-8"?>
+<p:sld xmlns:a="http://schemas.openxmlformats.org/drawingml/2006/main" xmlns:r="http://schemas.openxmlformats.org/officeDocument/2006/relationships" xmlns:p="http://schemas.openxmlformats.org/presentationml/2006/main">
+  <p:cSld>
+    <p:spTree>
+      <p:nvGrpSpPr>
+        <p:cNvPr id="1" name=""/>
+        <p:cNvGrpSpPr/>
+        <p:nvPr/>
+      </p:nvGrpSpPr>
+      <p:grpSpPr>
+        <a:xfrm>
+          <a:off x="0" y="0"/>
+          <a:ext cx="0" cy="0"/>
+          <a:chOff x="0" y="0"/>
+          <a:chExt cx="0" cy="0"/>
+        </a:xfrm>
+      </p:grpSpPr>
+      <p:sp>
+        <p:nvSpPr>
+          <p:cNvPr id="2" name="Titolo 1">
+            <a:extLst>
+              <a:ext uri="{FF2B5EF4-FFF2-40B4-BE49-F238E27FC236}">
+                <a16:creationId xmlns:a16="http://schemas.microsoft.com/office/drawing/2014/main" id="{E6AF7C7E-61E4-AEC4-743A-CDA10420B896}"/>
+              </a:ext>
+            </a:extLst>
+          </p:cNvPr>
+          <p:cNvSpPr>
+            <a:spLocks noGrp="1"/>
+          </p:cNvSpPr>
+          <p:nvPr>
+            <p:ph type="title"/>
+          </p:nvPr>
+        </p:nvSpPr>
+        <p:spPr>
+          <a:xfrm>
+            <a:off x="749528" y="278765"/>
+            <a:ext cx="9779183" cy="1600835"/>
+          </a:xfrm>
+        </p:spPr>
+        <p:txBody>
+          <a:bodyPr vert="horz" lIns="91440" tIns="45720" rIns="91440" bIns="45720" rtlCol="0" anchor="b">
+            <a:normAutofit/>
+          </a:bodyPr>
+          <a:lstStyle/>
+          <a:p>
+            <a:r>
+              <a:rPr lang="it-IT" b="1" kern="1200" dirty="0">
+                <a:latin typeface="+mj-lt"/>
+                <a:ea typeface="+mj-ea"/>
+                <a:cs typeface="+mj-cs"/>
+              </a:rPr>
+              <a:t>Conclusioni</a:t>
+            </a:r>
+          </a:p>
+        </p:txBody>
+      </p:sp>
+      <p:sp>
+        <p:nvSpPr>
+          <p:cNvPr id="5" name="CasellaDiTesto 4">
+            <a:extLst>
+              <a:ext uri="{FF2B5EF4-FFF2-40B4-BE49-F238E27FC236}">
+                <a16:creationId xmlns:a16="http://schemas.microsoft.com/office/drawing/2014/main" id="{2B3FB53C-929F-A3B8-AD82-9124A834F0E1}"/>
+              </a:ext>
+            </a:extLst>
+          </p:cNvPr>
+          <p:cNvSpPr txBox="1"/>
+          <p:nvPr/>
+        </p:nvSpPr>
+        <p:spPr>
+          <a:xfrm>
+            <a:off x="749528" y="2693353"/>
+            <a:ext cx="10197147" cy="3436936"/>
+          </a:xfrm>
+          <a:prstGeom prst="rect">
+            <a:avLst/>
+          </a:prstGeom>
+        </p:spPr>
+        <p:txBody>
+          <a:bodyPr vert="horz" lIns="91440" tIns="45720" rIns="91440" bIns="45720" rtlCol="0">
+            <a:normAutofit/>
+          </a:bodyPr>
+          <a:lstStyle/>
+          <a:p>
+            <a:pPr marL="342900" indent="-283464" algn="just">
+              <a:lnSpc>
+                <a:spcPct val="90000"/>
+              </a:lnSpc>
+              <a:spcBef>
+                <a:spcPts val="1000"/>
+              </a:spcBef>
+              <a:buFont typeface="Arial" panose="020B0604020202020204" pitchFamily="34" charset="0"/>
+              <a:buChar char="•"/>
+            </a:pPr>
+            <a:r>
+              <a:rPr lang="it-IT" sz="2000" b="1" dirty="0">
+                <a:solidFill>
+                  <a:schemeClr val="bg1"/>
+                </a:solidFill>
+              </a:rPr>
+              <a:t>Solidità Infrastrutturale:</a:t>
+            </a:r>
+            <a:r>
+              <a:rPr lang="it-IT" sz="2000" dirty="0">
+                <a:solidFill>
+                  <a:schemeClr val="bg1"/>
+                </a:solidFill>
+              </a:rPr>
+              <a:t> I benchmark confermano l'efficacia del cluster distribuito in quanto è stato ottenuta una scalabilità quasi lineare, dimostrando che il sistema converte efficientemente le risorse aggiuntive in velocità. L'integrazione con HDFS ha inoltre garantito la sopravvivenza del job anche in caso di guasti critici.</a:t>
+            </a:r>
+          </a:p>
+          <a:p>
+            <a:pPr marL="342900" indent="-283464" algn="just">
+              <a:lnSpc>
+                <a:spcPct val="90000"/>
+              </a:lnSpc>
+              <a:spcBef>
+                <a:spcPts val="1000"/>
+              </a:spcBef>
+              <a:buFont typeface="Arial" panose="020B0604020202020204" pitchFamily="34" charset="0"/>
+              <a:buChar char="•"/>
+            </a:pPr>
+            <a:r>
+              <a:rPr lang="it-IT" sz="2000" b="1" dirty="0">
+                <a:solidFill>
+                  <a:schemeClr val="bg1"/>
+                </a:solidFill>
+              </a:rPr>
+              <a:t>Valore Analitico: </a:t>
+            </a:r>
+            <a:r>
+              <a:rPr lang="it-IT" sz="2000" dirty="0">
+                <a:solidFill>
+                  <a:schemeClr val="bg1"/>
+                </a:solidFill>
+              </a:rPr>
+              <a:t>è stata superata la superficialità delle metriche quantitative e, mediante l'analisi semantica granulare, è stato possibile diagnosticare le cause radice specifiche per ogni applicazione e generali di insoddisfazione, trasformando milioni di dati grezzi in indicazioni strategiche reali.</a:t>
+            </a:r>
+          </a:p>
+          <a:p>
+            <a:pPr marL="342900" indent="-283464" algn="just">
+              <a:lnSpc>
+                <a:spcPct val="90000"/>
+              </a:lnSpc>
+              <a:spcBef>
+                <a:spcPts val="1000"/>
+              </a:spcBef>
+              <a:buFont typeface="Arial" panose="020B0604020202020204" pitchFamily="34" charset="0"/>
+              <a:buChar char="•"/>
+            </a:pPr>
+            <a:r>
+              <a:rPr lang="it-IT" sz="2000" b="1" dirty="0">
+                <a:solidFill>
+                  <a:schemeClr val="bg1"/>
+                </a:solidFill>
+              </a:rPr>
+              <a:t>Verdetto Tecnologico: </a:t>
+            </a:r>
+            <a:r>
+              <a:rPr lang="it-IT" sz="2000" dirty="0">
+                <a:solidFill>
+                  <a:schemeClr val="bg1"/>
+                </a:solidFill>
+              </a:rPr>
+              <a:t>lo </a:t>
+            </a:r>
+            <a:r>
+              <a:rPr lang="it-IT" sz="2000" dirty="0" err="1">
+                <a:solidFill>
+                  <a:schemeClr val="bg1"/>
+                </a:solidFill>
+              </a:rPr>
+              <a:t>stack</a:t>
+            </a:r>
+            <a:r>
+              <a:rPr lang="it-IT" sz="2000" dirty="0">
+                <a:solidFill>
+                  <a:schemeClr val="bg1"/>
+                </a:solidFill>
+              </a:rPr>
+              <a:t> tecnologico utilizzato si conferma una soluzione industriale reale e capace di abbattere drasticamente la latenza decisionale su grandi volumi di dati non strutturati.</a:t>
+            </a:r>
+          </a:p>
+        </p:txBody>
+      </p:sp>
+    </p:spTree>
+    <p:extLst>
+      <p:ext uri="{BB962C8B-B14F-4D97-AF65-F5344CB8AC3E}">
+        <p14:creationId xmlns:p14="http://schemas.microsoft.com/office/powerpoint/2010/main" val="22191112"/>
       </p:ext>
     </p:extLst>
   </p:cSld>
@@ -30942,15 +30455,6 @@
 </file>
 
 <file path=customXml/item1.xml><?xml version="1.0" encoding="utf-8"?>
-<?mso-contentType ?>
-<FormTemplates xmlns="http://schemas.microsoft.com/sharepoint/v3/contenttype/forms">
-  <Display>DocumentLibraryForm</Display>
-  <Edit>DocumentLibraryForm</Edit>
-  <New>DocumentLibraryForm</New>
-</FormTemplates>
-</file>
-
-<file path=customXml/item2.xml><?xml version="1.0" encoding="utf-8"?>
 <p:properties xmlns:p="http://schemas.microsoft.com/office/2006/metadata/properties" xmlns:xsi="http://www.w3.org/2001/XMLSchema-instance" xmlns:pc="http://schemas.microsoft.com/office/infopath/2007/PartnerControls">
   <documentManagement>
     <_ip_UnifiedCompliancePolicyUIAction xmlns="http://schemas.microsoft.com/sharepoint/v3" xsi:nil="true"/>
@@ -30968,6 +30472,15 @@
     <MediaServiceKeyPoints xmlns="71af3243-3dd4-4a8d-8c0d-dd76da1f02a5" xsi:nil="true"/>
   </documentManagement>
 </p:properties>
+</file>
+
+<file path=customXml/item2.xml><?xml version="1.0" encoding="utf-8"?>
+<?mso-contentType ?>
+<FormTemplates xmlns="http://schemas.microsoft.com/sharepoint/v3/contenttype/forms">
+  <Display>DocumentLibraryForm</Display>
+  <Edit>DocumentLibraryForm</Edit>
+  <New>DocumentLibraryForm</New>
+</FormTemplates>
 </file>
 
 <file path=customXml/item3.xml><?xml version="1.0" encoding="utf-8"?>
@@ -31283,14 +30796,6 @@
 </file>
 
 <file path=customXml/itemProps1.xml><?xml version="1.0" encoding="utf-8"?>
-<ds:datastoreItem xmlns:ds="http://schemas.openxmlformats.org/officeDocument/2006/customXml" ds:itemID="{45A8381C-73EB-48EA-B45F-7B7C8C7DF409}">
-  <ds:schemaRefs>
-    <ds:schemaRef ds:uri="http://schemas.microsoft.com/sharepoint/v3/contenttype/forms"/>
-  </ds:schemaRefs>
-</ds:datastoreItem>
-</file>
-
-<file path=customXml/itemProps2.xml><?xml version="1.0" encoding="utf-8"?>
 <ds:datastoreItem xmlns:ds="http://schemas.openxmlformats.org/officeDocument/2006/customXml" ds:itemID="{61E98C35-9ECE-4425-BCBA-00E118C705CE}">
   <ds:schemaRefs>
     <ds:schemaRef ds:uri="http://schemas.microsoft.com/office/2006/metadata/properties"/>
@@ -31298,6 +30803,14 @@
     <ds:schemaRef ds:uri="http://schemas.microsoft.com/sharepoint/v3"/>
     <ds:schemaRef ds:uri="71af3243-3dd4-4a8d-8c0d-dd76da1f02a5"/>
     <ds:schemaRef ds:uri="230e9df3-be65-4c73-a93b-d1236ebd677e"/>
+  </ds:schemaRefs>
+</ds:datastoreItem>
+</file>
+
+<file path=customXml/itemProps2.xml><?xml version="1.0" encoding="utf-8"?>
+<ds:datastoreItem xmlns:ds="http://schemas.openxmlformats.org/officeDocument/2006/customXml" ds:itemID="{45A8381C-73EB-48EA-B45F-7B7C8C7DF409}">
+  <ds:schemaRefs>
+    <ds:schemaRef ds:uri="http://schemas.microsoft.com/sharepoint/v3/contenttype/forms"/>
   </ds:schemaRefs>
 </ds:datastoreItem>
 </file>

</xml_diff>